<commit_message>
fixed formula and references
</commit_message>
<xml_diff>
--- a/poster.pptx
+++ b/poster.pptx
@@ -16,7 +16,7 @@
   <p:sldSz cx="42811700" cy="30275213"/>
   <p:notesSz cx="9239250" cy="11982450"/>
   <p:custDataLst>
-    <p:tags r:id="rId6"/>
+    <p:tags r:id="rId5"/>
   </p:custDataLst>
   <p:defaultTextStyle>
     <a:defPPr>
@@ -208,7 +208,7 @@
   </p:defaultTextStyle>
   <p:extLst>
     <p:ext uri="{EFAFB233-063F-42B5-8137-9DF3F51BA10A}">
-      <p15:sldGuideLst xmlns:p15="http://schemas.microsoft.com/office/powerpoint/2012/main" xmlns="">
+      <p15:sldGuideLst xmlns:p15="http://schemas.microsoft.com/office/powerpoint/2012/main">
         <p15:guide id="1" orient="horz" pos="11088">
           <p15:clr>
             <a:srgbClr val="A4A3A4"/>
@@ -232,7 +232,7 @@
       </p15:sldGuideLst>
     </p:ext>
     <p:ext uri="{2D200454-40CA-4A62-9FC3-DE9A4176ACB9}">
-      <p15:notesGuideLst xmlns:p15="http://schemas.microsoft.com/office/powerpoint/2012/main" xmlns="">
+      <p15:notesGuideLst xmlns:p15="http://schemas.microsoft.com/office/powerpoint/2012/main">
         <p15:guide id="1" orient="horz" pos="3774">
           <p15:clr>
             <a:srgbClr val="A4A3A4"/>
@@ -298,14 +298,14 @@
           </a:ln>
           <a:extLst>
             <a:ext uri="{909E8E84-426E-40dd-AFC4-6F175D3DCCD1}">
-              <a14:hiddenFill xmlns:a14="http://schemas.microsoft.com/office/drawing/2010/main">
+              <a14:hiddenFill xmlns:a14="http://schemas.microsoft.com/office/drawing/2010/main" xmlns="">
                 <a:solidFill>
                   <a:schemeClr val="accent1"/>
                 </a:solidFill>
               </a14:hiddenFill>
             </a:ext>
             <a:ext uri="{91240B29-F687-4f45-9708-019B960494DF}">
-              <a14:hiddenLine xmlns:a14="http://schemas.microsoft.com/office/drawing/2010/main" w="9525">
+              <a14:hiddenLine xmlns:a14="http://schemas.microsoft.com/office/drawing/2010/main" xmlns="" w="9525">
                 <a:solidFill>
                   <a:schemeClr val="tx1"/>
                 </a:solidFill>
@@ -315,7 +315,7 @@
               </a14:hiddenLine>
             </a:ext>
             <a:ext uri="{AF507438-7753-43e0-B8FC-AC1667EBCBE1}">
-              <a14:hiddenEffects xmlns:a14="http://schemas.microsoft.com/office/drawing/2010/main">
+              <a14:hiddenEffects xmlns:a14="http://schemas.microsoft.com/office/drawing/2010/main" xmlns="">
                 <a:effectLst>
                   <a:outerShdw dist="35921" dir="2700000" algn="ctr" rotWithShape="0">
                     <a:schemeClr val="bg2"/>
@@ -368,14 +368,14 @@
           </a:ln>
           <a:extLst>
             <a:ext uri="{909E8E84-426E-40dd-AFC4-6F175D3DCCD1}">
-              <a14:hiddenFill xmlns:a14="http://schemas.microsoft.com/office/drawing/2010/main">
+              <a14:hiddenFill xmlns:a14="http://schemas.microsoft.com/office/drawing/2010/main" xmlns="">
                 <a:solidFill>
                   <a:schemeClr val="accent1"/>
                 </a:solidFill>
               </a14:hiddenFill>
             </a:ext>
             <a:ext uri="{91240B29-F687-4f45-9708-019B960494DF}">
-              <a14:hiddenLine xmlns:a14="http://schemas.microsoft.com/office/drawing/2010/main" w="9525">
+              <a14:hiddenLine xmlns:a14="http://schemas.microsoft.com/office/drawing/2010/main" xmlns="" w="9525">
                 <a:solidFill>
                   <a:schemeClr val="tx1"/>
                 </a:solidFill>
@@ -385,7 +385,7 @@
               </a14:hiddenLine>
             </a:ext>
             <a:ext uri="{AF507438-7753-43e0-B8FC-AC1667EBCBE1}">
-              <a14:hiddenEffects xmlns:a14="http://schemas.microsoft.com/office/drawing/2010/main">
+              <a14:hiddenEffects xmlns:a14="http://schemas.microsoft.com/office/drawing/2010/main" xmlns="">
                 <a:effectLst>
                   <a:outerShdw dist="35921" dir="2700000" algn="ctr" rotWithShape="0">
                     <a:schemeClr val="bg2"/>
@@ -438,14 +438,14 @@
           </a:ln>
           <a:extLst>
             <a:ext uri="{909E8E84-426E-40dd-AFC4-6F175D3DCCD1}">
-              <a14:hiddenFill xmlns:a14="http://schemas.microsoft.com/office/drawing/2010/main">
+              <a14:hiddenFill xmlns:a14="http://schemas.microsoft.com/office/drawing/2010/main" xmlns="">
                 <a:solidFill>
                   <a:schemeClr val="accent1"/>
                 </a:solidFill>
               </a14:hiddenFill>
             </a:ext>
             <a:ext uri="{91240B29-F687-4f45-9708-019B960494DF}">
-              <a14:hiddenLine xmlns:a14="http://schemas.microsoft.com/office/drawing/2010/main" w="9525">
+              <a14:hiddenLine xmlns:a14="http://schemas.microsoft.com/office/drawing/2010/main" xmlns="" w="9525">
                 <a:solidFill>
                   <a:schemeClr val="tx1"/>
                 </a:solidFill>
@@ -455,7 +455,7 @@
               </a14:hiddenLine>
             </a:ext>
             <a:ext uri="{AF507438-7753-43e0-B8FC-AC1667EBCBE1}">
-              <a14:hiddenEffects xmlns:a14="http://schemas.microsoft.com/office/drawing/2010/main">
+              <a14:hiddenEffects xmlns:a14="http://schemas.microsoft.com/office/drawing/2010/main" xmlns="">
                 <a:effectLst>
                   <a:outerShdw dist="35921" dir="2700000" algn="ctr" rotWithShape="0">
                     <a:schemeClr val="bg2"/>
@@ -508,14 +508,14 @@
           </a:ln>
           <a:extLst>
             <a:ext uri="{909E8E84-426E-40dd-AFC4-6F175D3DCCD1}">
-              <a14:hiddenFill xmlns:a14="http://schemas.microsoft.com/office/drawing/2010/main">
+              <a14:hiddenFill xmlns:a14="http://schemas.microsoft.com/office/drawing/2010/main" xmlns="">
                 <a:solidFill>
                   <a:schemeClr val="accent1"/>
                 </a:solidFill>
               </a14:hiddenFill>
             </a:ext>
             <a:ext uri="{91240B29-F687-4f45-9708-019B960494DF}">
-              <a14:hiddenLine xmlns:a14="http://schemas.microsoft.com/office/drawing/2010/main" w="9525">
+              <a14:hiddenLine xmlns:a14="http://schemas.microsoft.com/office/drawing/2010/main" xmlns="" w="9525">
                 <a:solidFill>
                   <a:schemeClr val="tx1"/>
                 </a:solidFill>
@@ -525,7 +525,7 @@
               </a14:hiddenLine>
             </a:ext>
             <a:ext uri="{AF507438-7753-43e0-B8FC-AC1667EBCBE1}">
-              <a14:hiddenEffects xmlns:a14="http://schemas.microsoft.com/office/drawing/2010/main">
+              <a14:hiddenEffects xmlns:a14="http://schemas.microsoft.com/office/drawing/2010/main" xmlns="">
                 <a:effectLst>
                   <a:outerShdw dist="35921" dir="2700000" algn="ctr" rotWithShape="0">
                     <a:schemeClr val="bg2"/>
@@ -618,14 +618,14 @@
           </a:ln>
           <a:extLst>
             <a:ext uri="{909E8E84-426E-40dd-AFC4-6F175D3DCCD1}">
-              <a14:hiddenFill xmlns:a14="http://schemas.microsoft.com/office/drawing/2010/main">
+              <a14:hiddenFill xmlns:a14="http://schemas.microsoft.com/office/drawing/2010/main" xmlns="">
                 <a:solidFill>
                   <a:schemeClr val="accent1"/>
                 </a:solidFill>
               </a14:hiddenFill>
             </a:ext>
             <a:ext uri="{91240B29-F687-4f45-9708-019B960494DF}">
-              <a14:hiddenLine xmlns:a14="http://schemas.microsoft.com/office/drawing/2010/main" w="9525">
+              <a14:hiddenLine xmlns:a14="http://schemas.microsoft.com/office/drawing/2010/main" xmlns="" w="9525">
                 <a:solidFill>
                   <a:schemeClr val="tx1"/>
                 </a:solidFill>
@@ -635,7 +635,7 @@
               </a14:hiddenLine>
             </a:ext>
             <a:ext uri="{AF507438-7753-43e0-B8FC-AC1667EBCBE1}">
-              <a14:hiddenEffects xmlns:a14="http://schemas.microsoft.com/office/drawing/2010/main">
+              <a14:hiddenEffects xmlns:a14="http://schemas.microsoft.com/office/drawing/2010/main" xmlns="">
                 <a:effectLst>
                   <a:outerShdw dist="35921" dir="2700000" algn="ctr" rotWithShape="0">
                     <a:schemeClr val="bg2"/>
@@ -688,14 +688,14 @@
           </a:ln>
           <a:extLst>
             <a:ext uri="{909E8E84-426E-40dd-AFC4-6F175D3DCCD1}">
-              <a14:hiddenFill xmlns:a14="http://schemas.microsoft.com/office/drawing/2010/main">
+              <a14:hiddenFill xmlns:a14="http://schemas.microsoft.com/office/drawing/2010/main" xmlns="">
                 <a:solidFill>
                   <a:schemeClr val="accent1"/>
                 </a:solidFill>
               </a14:hiddenFill>
             </a:ext>
             <a:ext uri="{91240B29-F687-4f45-9708-019B960494DF}">
-              <a14:hiddenLine xmlns:a14="http://schemas.microsoft.com/office/drawing/2010/main" w="9525">
+              <a14:hiddenLine xmlns:a14="http://schemas.microsoft.com/office/drawing/2010/main" xmlns="" w="9525">
                 <a:solidFill>
                   <a:schemeClr val="tx1"/>
                 </a:solidFill>
@@ -705,7 +705,7 @@
               </a14:hiddenLine>
             </a:ext>
             <a:ext uri="{AF507438-7753-43e0-B8FC-AC1667EBCBE1}">
-              <a14:hiddenEffects xmlns:a14="http://schemas.microsoft.com/office/drawing/2010/main">
+              <a14:hiddenEffects xmlns:a14="http://schemas.microsoft.com/office/drawing/2010/main" xmlns="">
                 <a:effectLst>
                   <a:outerShdw dist="35921" dir="2700000" algn="ctr" rotWithShape="0">
                     <a:schemeClr val="bg2"/>
@@ -761,14 +761,14 @@
           </a:ln>
           <a:extLst>
             <a:ext uri="{909E8E84-426E-40dd-AFC4-6F175D3DCCD1}">
-              <a14:hiddenFill xmlns:a14="http://schemas.microsoft.com/office/drawing/2010/main">
+              <a14:hiddenFill xmlns:a14="http://schemas.microsoft.com/office/drawing/2010/main" xmlns="">
                 <a:solidFill>
                   <a:srgbClr val="FFFFFF"/>
                 </a:solidFill>
               </a14:hiddenFill>
             </a:ext>
             <a:ext uri="{AF507438-7753-43e0-B8FC-AC1667EBCBE1}">
-              <a14:hiddenEffects xmlns:a14="http://schemas.microsoft.com/office/drawing/2010/main">
+              <a14:hiddenEffects xmlns:a14="http://schemas.microsoft.com/office/drawing/2010/main" xmlns="">
                 <a:effectLst>
                   <a:outerShdw dist="35921" dir="2700000" algn="ctr" rotWithShape="0">
                     <a:srgbClr val="808080"/>
@@ -777,7 +777,7 @@
               </a14:hiddenEffects>
             </a:ext>
             <a:ext uri="{53640926-AAD7-44d8-BBD7-CCE9431645EC}">
-              <a14:shadowObscured xmlns:a14="http://schemas.microsoft.com/office/drawing/2010/main" val="1"/>
+              <a14:shadowObscured xmlns:a14="http://schemas.microsoft.com/office/drawing/2010/main" xmlns="" val="1"/>
             </a:ext>
           </a:extLst>
         </p:spPr>
@@ -806,14 +806,14 @@
           </a:ln>
           <a:extLst>
             <a:ext uri="{909E8E84-426E-40dd-AFC4-6F175D3DCCD1}">
-              <a14:hiddenFill xmlns:a14="http://schemas.microsoft.com/office/drawing/2010/main">
+              <a14:hiddenFill xmlns:a14="http://schemas.microsoft.com/office/drawing/2010/main" xmlns="">
                 <a:solidFill>
                   <a:schemeClr val="accent1"/>
                 </a:solidFill>
               </a14:hiddenFill>
             </a:ext>
             <a:ext uri="{91240B29-F687-4f45-9708-019B960494DF}">
-              <a14:hiddenLine xmlns:a14="http://schemas.microsoft.com/office/drawing/2010/main" w="9525">
+              <a14:hiddenLine xmlns:a14="http://schemas.microsoft.com/office/drawing/2010/main" xmlns="" w="9525">
                 <a:solidFill>
                   <a:schemeClr val="tx1"/>
                 </a:solidFill>
@@ -823,7 +823,7 @@
               </a14:hiddenLine>
             </a:ext>
             <a:ext uri="{AF507438-7753-43e0-B8FC-AC1667EBCBE1}">
-              <a14:hiddenEffects xmlns:a14="http://schemas.microsoft.com/office/drawing/2010/main">
+              <a14:hiddenEffects xmlns:a14="http://schemas.microsoft.com/office/drawing/2010/main" xmlns="">
                 <a:effectLst>
                   <a:outerShdw dist="35921" dir="2700000" algn="ctr" rotWithShape="0">
                     <a:schemeClr val="bg2"/>
@@ -905,14 +905,14 @@
           </a:ln>
           <a:extLst>
             <a:ext uri="{909E8E84-426E-40dd-AFC4-6F175D3DCCD1}">
-              <a14:hiddenFill xmlns:a14="http://schemas.microsoft.com/office/drawing/2010/main">
+              <a14:hiddenFill xmlns:a14="http://schemas.microsoft.com/office/drawing/2010/main" xmlns="">
                 <a:solidFill>
                   <a:schemeClr val="accent1"/>
                 </a:solidFill>
               </a14:hiddenFill>
             </a:ext>
             <a:ext uri="{91240B29-F687-4f45-9708-019B960494DF}">
-              <a14:hiddenLine xmlns:a14="http://schemas.microsoft.com/office/drawing/2010/main" w="9525">
+              <a14:hiddenLine xmlns:a14="http://schemas.microsoft.com/office/drawing/2010/main" xmlns="" w="9525">
                 <a:solidFill>
                   <a:schemeClr val="tx1"/>
                 </a:solidFill>
@@ -922,7 +922,7 @@
               </a14:hiddenLine>
             </a:ext>
             <a:ext uri="{AF507438-7753-43e0-B8FC-AC1667EBCBE1}">
-              <a14:hiddenEffects xmlns:a14="http://schemas.microsoft.com/office/drawing/2010/main">
+              <a14:hiddenEffects xmlns:a14="http://schemas.microsoft.com/office/drawing/2010/main" xmlns="">
                 <a:effectLst>
                   <a:outerShdw dist="35921" dir="2700000" algn="ctr" rotWithShape="0">
                     <a:schemeClr val="bg2"/>
@@ -975,14 +975,14 @@
           </a:ln>
           <a:extLst>
             <a:ext uri="{909E8E84-426E-40dd-AFC4-6F175D3DCCD1}">
-              <a14:hiddenFill xmlns:a14="http://schemas.microsoft.com/office/drawing/2010/main">
+              <a14:hiddenFill xmlns:a14="http://schemas.microsoft.com/office/drawing/2010/main" xmlns="">
                 <a:solidFill>
                   <a:schemeClr val="accent1"/>
                 </a:solidFill>
               </a14:hiddenFill>
             </a:ext>
             <a:ext uri="{91240B29-F687-4f45-9708-019B960494DF}">
-              <a14:hiddenLine xmlns:a14="http://schemas.microsoft.com/office/drawing/2010/main" w="9525">
+              <a14:hiddenLine xmlns:a14="http://schemas.microsoft.com/office/drawing/2010/main" xmlns="" w="9525">
                 <a:solidFill>
                   <a:schemeClr val="tx1"/>
                 </a:solidFill>
@@ -992,7 +992,7 @@
               </a14:hiddenLine>
             </a:ext>
             <a:ext uri="{AF507438-7753-43e0-B8FC-AC1667EBCBE1}">
-              <a14:hiddenEffects xmlns:a14="http://schemas.microsoft.com/office/drawing/2010/main">
+              <a14:hiddenEffects xmlns:a14="http://schemas.microsoft.com/office/drawing/2010/main" xmlns="">
                 <a:effectLst>
                   <a:outerShdw dist="35921" dir="2700000" algn="ctr" rotWithShape="0">
                     <a:schemeClr val="bg2"/>
@@ -1488,7 +1488,7 @@
   <p:clrMapOvr>
     <a:masterClrMapping/>
   </p:clrMapOvr>
-  <p:transition xmlns:p14="http://schemas.microsoft.com/office/powerpoint/2010/main"/>
+  <p:transition/>
 </p:sldLayout>
 </file>
 
@@ -1618,7 +1618,7 @@
   <p:clrMapOvr>
     <a:masterClrMapping/>
   </p:clrMapOvr>
-  <p:transition xmlns:p14="http://schemas.microsoft.com/office/powerpoint/2010/main"/>
+  <p:transition/>
 </p:sldLayout>
 </file>
 
@@ -1748,7 +1748,7 @@
   <p:clrMapOvr>
     <a:masterClrMapping/>
   </p:clrMapOvr>
-  <p:transition xmlns:p14="http://schemas.microsoft.com/office/powerpoint/2010/main"/>
+  <p:transition/>
 </p:sldLayout>
 </file>
 
@@ -1878,7 +1878,7 @@
   <p:clrMapOvr>
     <a:masterClrMapping/>
   </p:clrMapOvr>
-  <p:transition xmlns:p14="http://schemas.microsoft.com/office/powerpoint/2010/main"/>
+  <p:transition/>
 </p:sldLayout>
 </file>
 
@@ -2018,7 +2018,7 @@
   <p:clrMapOvr>
     <a:masterClrMapping/>
   </p:clrMapOvr>
-  <p:transition xmlns:p14="http://schemas.microsoft.com/office/powerpoint/2010/main"/>
+  <p:transition/>
 </p:sldLayout>
 </file>
 
@@ -2266,7 +2266,7 @@
   <p:clrMapOvr>
     <a:masterClrMapping/>
   </p:clrMapOvr>
-  <p:transition xmlns:p14="http://schemas.microsoft.com/office/powerpoint/2010/main"/>
+  <p:transition/>
 </p:sldLayout>
 </file>
 
@@ -2659,7 +2659,7 @@
   <p:clrMapOvr>
     <a:masterClrMapping/>
   </p:clrMapOvr>
-  <p:transition xmlns:p14="http://schemas.microsoft.com/office/powerpoint/2010/main"/>
+  <p:transition/>
 </p:sldLayout>
 </file>
 
@@ -2725,7 +2725,7 @@
   <p:clrMapOvr>
     <a:masterClrMapping/>
   </p:clrMapOvr>
-  <p:transition xmlns:p14="http://schemas.microsoft.com/office/powerpoint/2010/main"/>
+  <p:transition/>
 </p:sldLayout>
 </file>
 
@@ -2756,7 +2756,7 @@
   <p:clrMapOvr>
     <a:masterClrMapping/>
   </p:clrMapOvr>
-  <p:transition xmlns:p14="http://schemas.microsoft.com/office/powerpoint/2010/main"/>
+  <p:transition/>
 </p:sldLayout>
 </file>
 
@@ -2987,7 +2987,7 @@
   <p:clrMapOvr>
     <a:masterClrMapping/>
   </p:clrMapOvr>
-  <p:transition xmlns:p14="http://schemas.microsoft.com/office/powerpoint/2010/main"/>
+  <p:transition/>
 </p:sldLayout>
 </file>
 
@@ -3195,7 +3195,7 @@
   <p:clrMapOvr>
     <a:masterClrMapping/>
   </p:clrMapOvr>
-  <p:transition xmlns:p14="http://schemas.microsoft.com/office/powerpoint/2010/main"/>
+  <p:transition/>
 </p:sldLayout>
 </file>
 
@@ -3361,7 +3361,7 @@
     <p:sldLayoutId id="2147483658" r:id="rId10"/>
     <p:sldLayoutId id="2147483659" r:id="rId11"/>
   </p:sldLayoutIdLst>
-  <p:transition xmlns:p14="http://schemas.microsoft.com/office/powerpoint/2010/main"/>
+  <p:transition/>
   <p:txStyles>
     <p:titleStyle>
       <a:defPPr>
@@ -4095,14 +4095,14 @@
           </a:ln>
           <a:extLst>
             <a:ext uri="{909E8E84-426E-40dd-AFC4-6F175D3DCCD1}">
-              <a14:hiddenFill xmlns:a14="http://schemas.microsoft.com/office/drawing/2010/main">
+              <a14:hiddenFill xmlns:a14="http://schemas.microsoft.com/office/drawing/2010/main" xmlns="">
                 <a:solidFill>
                   <a:srgbClr val="000000"/>
                 </a:solidFill>
               </a14:hiddenFill>
             </a:ext>
             <a:ext uri="{91240B29-F687-4f45-9708-019B960494DF}">
-              <a14:hiddenLine xmlns:a14="http://schemas.microsoft.com/office/drawing/2010/main" w="9525">
+              <a14:hiddenLine xmlns:a14="http://schemas.microsoft.com/office/drawing/2010/main" xmlns="" w="9525">
                 <a:solidFill>
                   <a:schemeClr val="tx1"/>
                 </a:solidFill>
@@ -4112,7 +4112,7 @@
               </a14:hiddenLine>
             </a:ext>
             <a:ext uri="{AF507438-7753-43e0-B8FC-AC1667EBCBE1}">
-              <a14:hiddenEffects xmlns:a14="http://schemas.microsoft.com/office/drawing/2010/main">
+              <a14:hiddenEffects xmlns:a14="http://schemas.microsoft.com/office/drawing/2010/main" xmlns="">
                 <a:effectLst>
                   <a:outerShdw dist="35921" dir="2700000" algn="ctr" rotWithShape="0">
                     <a:srgbClr val="FFBF0B"/>
@@ -4387,7 +4387,7 @@
           </a:ln>
           <a:extLst>
             <a:ext uri="{AF507438-7753-43e0-B8FC-AC1667EBCBE1}">
-              <a14:hiddenEffects xmlns:a14="http://schemas.microsoft.com/office/drawing/2010/main">
+              <a14:hiddenEffects xmlns:a14="http://schemas.microsoft.com/office/drawing/2010/main" xmlns="">
                 <a:effectLst>
                   <a:outerShdw dist="35921" dir="2700000" algn="ctr" rotWithShape="0">
                     <a:schemeClr val="bg2"/>
@@ -4524,55 +4524,55 @@
               <a:rPr lang="et-EE" altLang="ja-JP" sz="3600" dirty="0" smtClean="0">
                 <a:ea typeface="ＭＳ Ｐゴシック" charset="-128"/>
               </a:rPr>
-              <a:t>(DTW) for educational </a:t>
+              <a:t>(DTW) for educational purposes</a:t>
+            </a:r>
+            <a:r>
+              <a:rPr lang="et-EE" altLang="ja-JP" sz="3600" dirty="0">
+                <a:ea typeface="ＭＳ Ｐゴシック" charset="-128"/>
+              </a:rPr>
+              <a:t>.</a:t>
             </a:r>
             <a:r>
               <a:rPr lang="et-EE" altLang="ja-JP" sz="3600" dirty="0" smtClean="0">
                 <a:ea typeface="ＭＳ Ｐゴシック" charset="-128"/>
               </a:rPr>
-              <a:t>purposes</a:t>
-            </a:r>
-            <a:r>
-              <a:rPr lang="et-EE" altLang="ja-JP" sz="3600" dirty="0">
+              <a:t> </a:t>
+            </a:r>
+            <a:r>
+              <a:rPr lang="en-US" altLang="ja-JP" sz="3600" dirty="0" smtClean="0">
                 <a:ea typeface="ＭＳ Ｐゴシック" charset="-128"/>
               </a:rPr>
-              <a:t>.</a:t>
+              <a:t>The </a:t>
+            </a:r>
+            <a:r>
+              <a:rPr lang="en-US" altLang="ja-JP" sz="3600" dirty="0">
+                <a:ea typeface="ＭＳ Ｐゴシック" charset="-128"/>
+              </a:rPr>
+              <a:t>task of </a:t>
+            </a:r>
+            <a:r>
+              <a:rPr lang="en-US" altLang="ja-JP" sz="3600" dirty="0" smtClean="0">
+                <a:ea typeface="ＭＳ Ｐゴシック" charset="-128"/>
+              </a:rPr>
+              <a:t>(</a:t>
+            </a:r>
+            <a:r>
+              <a:rPr lang="en-US" altLang="ja-JP" sz="3600" dirty="0">
+                <a:ea typeface="ＭＳ Ｐゴシック" charset="-128"/>
+              </a:rPr>
+              <a:t>DTW) algorithm is to measure the similarity between two sequences. DTW algorithm was introduced in </a:t>
             </a:r>
             <a:r>
               <a:rPr lang="et-EE" altLang="ja-JP" sz="3600" dirty="0" smtClean="0">
                 <a:ea typeface="ＭＳ Ｐゴシック" charset="-128"/>
               </a:rPr>
-              <a:t> </a:t>
-            </a:r>
-            <a:r>
-              <a:rPr lang="en-US" altLang="ja-JP" sz="3600" dirty="0" smtClean="0">
-                <a:ea typeface="ＭＳ Ｐゴシック" charset="-128"/>
-              </a:rPr>
-              <a:t>The </a:t>
-            </a:r>
-            <a:r>
-              <a:rPr lang="en-US" altLang="ja-JP" sz="3600" dirty="0">
-                <a:ea typeface="ＭＳ Ｐゴシック" charset="-128"/>
-              </a:rPr>
-              <a:t>task of </a:t>
-            </a:r>
-            <a:r>
-              <a:rPr lang="en-US" altLang="ja-JP" sz="3600" dirty="0" smtClean="0">
-                <a:ea typeface="ＭＳ Ｐゴシック" charset="-128"/>
-              </a:rPr>
-              <a:t>(</a:t>
-            </a:r>
-            <a:r>
-              <a:rPr lang="en-US" altLang="ja-JP" sz="3600" dirty="0">
-                <a:ea typeface="ＭＳ Ｐゴシック" charset="-128"/>
-              </a:rPr>
-              <a:t>DTW) algorithm is to measure the similarity between two sequences. DTW algorithm was introduced in </a:t>
+              <a:t>[</a:t>
             </a:r>
             <a:r>
               <a:rPr lang="et-EE" altLang="ja-JP" sz="3600" dirty="0" smtClean="0">
                 <a:ea typeface="ＭＳ Ｐゴシック" charset="-128"/>
               </a:rPr>
-              <a:t>[SC78] </a:t>
+              <a:t>SC71] </a:t>
             </a:r>
             <a:r>
               <a:rPr lang="en-US" altLang="ja-JP" sz="3600" dirty="0">
@@ -4622,8 +4622,8 @@
             </p:nvSpPr>
             <p:spPr bwMode="auto">
               <a:xfrm>
-                <a:off x="908050" y="23378413"/>
-                <a:ext cx="11004710" cy="6530159"/>
+                <a:off x="908050" y="22751675"/>
+                <a:ext cx="11033820" cy="7350667"/>
               </a:xfrm>
               <a:prstGeom prst="rect">
                 <a:avLst/>
@@ -4749,7 +4749,7 @@
                   </a:lnSpc>
                 </a:pPr>
                 <a:r>
-                  <a:rPr lang="et-EE" altLang="zh-CN" sz="3600" dirty="0" err="1" smtClean="0">
+                  <a:rPr lang="et-EE" altLang="zh-CN" sz="3600" dirty="0" smtClean="0">
                     <a:solidFill>
                       <a:schemeClr val="tx1"/>
                     </a:solidFill>
@@ -4995,8 +4995,72 @@
                     </a:solidFill>
                     <a:ea typeface="ＭＳ Ｐゴシック" charset="-128"/>
                   </a:rPr>
-                  <a:t> We have that </a:t>
+                  <a:t> We have that the entry </a:t>
                 </a:r>
+                <a14:m>
+                  <m:oMath xmlns:m="http://schemas.openxmlformats.org/officeDocument/2006/math">
+                    <m:r>
+                      <a:rPr lang="et-EE" altLang="zh-CN" sz="3600" i="1" dirty="0" smtClean="0">
+                        <a:solidFill>
+                          <a:schemeClr val="tx1"/>
+                        </a:solidFill>
+                        <a:latin typeface="Cambria Math" panose="02040503050406030204" pitchFamily="18" charset="0"/>
+                        <a:ea typeface="ＭＳ Ｐゴシック" charset="-128"/>
+                      </a:rPr>
+                      <m:t>𝑑</m:t>
+                    </m:r>
+                    <m:r>
+                      <a:rPr lang="et-EE" altLang="zh-CN" sz="3600" i="1" dirty="0" smtClean="0">
+                        <a:solidFill>
+                          <a:schemeClr val="tx1"/>
+                        </a:solidFill>
+                        <a:latin typeface="Cambria Math" panose="02040503050406030204" pitchFamily="18" charset="0"/>
+                        <a:ea typeface="ＭＳ Ｐゴシック" charset="-128"/>
+                      </a:rPr>
+                      <m:t>(</m:t>
+                    </m:r>
+                    <m:r>
+                      <a:rPr lang="et-EE" altLang="zh-CN" sz="3600" i="1" dirty="0" smtClean="0">
+                        <a:solidFill>
+                          <a:schemeClr val="tx1"/>
+                        </a:solidFill>
+                        <a:latin typeface="Cambria Math" panose="02040503050406030204" pitchFamily="18" charset="0"/>
+                        <a:ea typeface="ＭＳ Ｐゴシック" charset="-128"/>
+                      </a:rPr>
+                      <m:t>𝑖</m:t>
+                    </m:r>
+                    <m:r>
+                      <a:rPr lang="et-EE" altLang="zh-CN" sz="3600" i="1" dirty="0" smtClean="0">
+                        <a:solidFill>
+                          <a:schemeClr val="tx1"/>
+                        </a:solidFill>
+                        <a:latin typeface="Cambria Math" panose="02040503050406030204" pitchFamily="18" charset="0"/>
+                        <a:ea typeface="ＭＳ Ｐゴシック" charset="-128"/>
+                      </a:rPr>
+                      <m:t>,</m:t>
+                    </m:r>
+                    <m:r>
+                      <a:rPr lang="et-EE" altLang="zh-CN" sz="3600" i="1" dirty="0" smtClean="0">
+                        <a:solidFill>
+                          <a:schemeClr val="tx1"/>
+                        </a:solidFill>
+                        <a:latin typeface="Cambria Math" panose="02040503050406030204" pitchFamily="18" charset="0"/>
+                        <a:ea typeface="ＭＳ Ｐゴシック" charset="-128"/>
+                      </a:rPr>
+                      <m:t>𝑗</m:t>
+                    </m:r>
+                    <m:r>
+                      <a:rPr lang="et-EE" altLang="zh-CN" sz="3600" i="1" dirty="0" smtClean="0">
+                        <a:solidFill>
+                          <a:schemeClr val="tx1"/>
+                        </a:solidFill>
+                        <a:latin typeface="Cambria Math" panose="02040503050406030204" pitchFamily="18" charset="0"/>
+                        <a:ea typeface="ＭＳ Ｐゴシック" charset="-128"/>
+                      </a:rPr>
+                      <m:t>)</m:t>
+                    </m:r>
+                  </m:oMath>
+                </a14:m>
                 <a:r>
                   <a:rPr lang="et-EE" altLang="zh-CN" sz="3600" dirty="0" smtClean="0">
                     <a:solidFill>
@@ -5004,32 +5068,8 @@
                     </a:solidFill>
                     <a:ea typeface="ＭＳ Ｐゴシック" charset="-128"/>
                   </a:rPr>
-                  <a:t>the entry d(i,j) in the cost matrix of given </a:t>
+                  <a:t> in the cost matrix of given series A and B is</a:t>
                 </a:r>
-                <a:r>
-                  <a:rPr lang="et-EE" altLang="zh-CN" sz="3600" dirty="0" smtClean="0">
-                    <a:solidFill>
-                      <a:schemeClr val="tx1"/>
-                    </a:solidFill>
-                    <a:ea typeface="ＭＳ Ｐゴシック" charset="-128"/>
-                  </a:rPr>
-                  <a:t>series A and </a:t>
-                </a:r>
-                <a:r>
-                  <a:rPr lang="et-EE" altLang="zh-CN" sz="3600" dirty="0" smtClean="0">
-                    <a:solidFill>
-                      <a:schemeClr val="tx1"/>
-                    </a:solidFill>
-                    <a:ea typeface="ＭＳ Ｐゴシック" charset="-128"/>
-                  </a:rPr>
-                  <a:t>B is</a:t>
-                </a:r>
-                <a:endParaRPr lang="et-EE" altLang="zh-CN" sz="3600" dirty="0" smtClean="0">
-                  <a:solidFill>
-                    <a:schemeClr val="tx1"/>
-                  </a:solidFill>
-                  <a:ea typeface="ＭＳ Ｐゴシック" charset="-128"/>
-                </a:endParaRPr>
               </a:p>
               <a:p>
                 <a:pPr marL="0" lvl="1" indent="0" algn="just">
@@ -5037,47 +5077,293 @@
                     <a:spcPct val="120000"/>
                   </a:lnSpc>
                 </a:pPr>
-                <a14:m/>
                 <a:r>
-                  <a:rPr lang="et-EE" altLang="zh-CN" sz="3600" dirty="0" smtClean="0">
+                  <a:rPr lang="et-EE" altLang="zh-CN" sz="3200" dirty="0" smtClean="0">
                     <a:solidFill>
                       <a:schemeClr val="tx1"/>
                     </a:solidFill>
                     <a:ea typeface="ＭＳ Ｐゴシック" charset="-128"/>
                   </a:rPr>
-                  <a:t> = </a:t>
+                  <a:t> </a:t>
                 </a:r>
-                <a14:m/>
-                <a:r>
-                  <a:rPr lang="et-EE" altLang="zh-CN" sz="3600" dirty="0" smtClean="0">
-                    <a:solidFill>
-                      <a:schemeClr val="tx1"/>
-                    </a:solidFill>
-                    <a:ea typeface="ＭＳ Ｐゴシック" charset="-128"/>
-                  </a:rPr>
-                  <a:t>min </a:t>
-                </a:r>
-                <a14:m/>
-                <a:endParaRPr lang="en-US" altLang="zh-CN" sz="3600" dirty="0">
+                <a14:m>
+                  <m:oMath xmlns:m="http://schemas.openxmlformats.org/officeDocument/2006/math">
+                    <m:r>
+                      <a:rPr lang="et-EE" altLang="zh-CN" sz="3200" i="1" dirty="0" err="1" smtClean="0">
+                        <a:latin typeface="Cambria Math" panose="02040503050406030204" pitchFamily="18" charset="0"/>
+                        <a:ea typeface="ＭＳ Ｐゴシック" charset="-128"/>
+                      </a:rPr>
+                      <m:t>𝑑𝑖𝑠𝑡𝑎𝑛𝑐𝑒</m:t>
+                    </m:r>
+                    <m:r>
+                      <a:rPr lang="et-EE" altLang="zh-CN" sz="3200" i="1" dirty="0" smtClean="0">
+                        <a:latin typeface="Cambria Math" panose="02040503050406030204" pitchFamily="18" charset="0"/>
+                        <a:ea typeface="ＭＳ Ｐゴシック" charset="-128"/>
+                      </a:rPr>
+                      <m:t>(</m:t>
+                    </m:r>
+                    <m:r>
+                      <a:rPr lang="et-EE" altLang="zh-CN" sz="3200" i="1" dirty="0" smtClean="0">
+                        <a:latin typeface="Cambria Math" panose="02040503050406030204" pitchFamily="18" charset="0"/>
+                        <a:ea typeface="ＭＳ Ｐゴシック" charset="-128"/>
+                      </a:rPr>
+                      <m:t>𝐴</m:t>
+                    </m:r>
+                    <m:r>
+                      <a:rPr lang="et-EE" altLang="zh-CN" sz="3200" i="1" dirty="0" smtClean="0">
+                        <a:latin typeface="Cambria Math" panose="02040503050406030204" pitchFamily="18" charset="0"/>
+                        <a:ea typeface="ＭＳ Ｐゴシック" charset="-128"/>
+                      </a:rPr>
+                      <m:t>(</m:t>
+                    </m:r>
+                    <m:r>
+                      <a:rPr lang="et-EE" altLang="zh-CN" sz="3200" i="1" dirty="0" smtClean="0">
+                        <a:latin typeface="Cambria Math" panose="02040503050406030204" pitchFamily="18" charset="0"/>
+                        <a:ea typeface="ＭＳ Ｐゴシック" charset="-128"/>
+                      </a:rPr>
+                      <m:t>𝑖</m:t>
+                    </m:r>
+                    <m:r>
+                      <a:rPr lang="et-EE" altLang="zh-CN" sz="3200" i="1" dirty="0" smtClean="0">
+                        <a:latin typeface="Cambria Math" panose="02040503050406030204" pitchFamily="18" charset="0"/>
+                        <a:ea typeface="ＭＳ Ｐゴシック" charset="-128"/>
+                      </a:rPr>
+                      <m:t>), </m:t>
+                    </m:r>
+                    <m:r>
+                      <a:rPr lang="et-EE" altLang="zh-CN" sz="3200" i="1" dirty="0" smtClean="0">
+                        <a:latin typeface="Cambria Math" panose="02040503050406030204" pitchFamily="18" charset="0"/>
+                        <a:ea typeface="ＭＳ Ｐゴシック" charset="-128"/>
+                      </a:rPr>
+                      <m:t>𝐵</m:t>
+                    </m:r>
+                    <m:r>
+                      <a:rPr lang="et-EE" altLang="zh-CN" sz="3200" i="1" dirty="0" smtClean="0">
+                        <a:latin typeface="Cambria Math" panose="02040503050406030204" pitchFamily="18" charset="0"/>
+                        <a:ea typeface="ＭＳ Ｐゴシック" charset="-128"/>
+                      </a:rPr>
+                      <m:t>(</m:t>
+                    </m:r>
+                    <m:r>
+                      <a:rPr lang="et-EE" altLang="zh-CN" sz="3200" i="1" dirty="0" smtClean="0">
+                        <a:latin typeface="Cambria Math" panose="02040503050406030204" pitchFamily="18" charset="0"/>
+                        <a:ea typeface="ＭＳ Ｐゴシック" charset="-128"/>
+                      </a:rPr>
+                      <m:t>𝑗</m:t>
+                    </m:r>
+                    <m:r>
+                      <a:rPr lang="et-EE" altLang="zh-CN" sz="3200" i="1" dirty="0" smtClean="0">
+                        <a:latin typeface="Cambria Math" panose="02040503050406030204" pitchFamily="18" charset="0"/>
+                        <a:ea typeface="ＭＳ Ｐゴシック" charset="-128"/>
+                      </a:rPr>
+                      <m:t>)) +</m:t>
+                    </m:r>
+                    <m:r>
+                      <a:rPr lang="et-EE" altLang="zh-CN" sz="3200" b="0" i="1" dirty="0" smtClean="0">
+                        <a:latin typeface="Cambria Math" panose="02040503050406030204" pitchFamily="18" charset="0"/>
+                        <a:ea typeface="ＭＳ Ｐゴシック" charset="-128"/>
+                      </a:rPr>
+                      <m:t>𝑚𝑖𝑛</m:t>
+                    </m:r>
+                    <m:r>
+                      <a:rPr lang="et-EE" altLang="zh-CN" sz="3200" i="1" dirty="0" smtClean="0">
+                        <a:latin typeface="Cambria Math" panose="02040503050406030204" pitchFamily="18" charset="0"/>
+                        <a:ea typeface="ＭＳ Ｐゴシック" charset="-128"/>
+                      </a:rPr>
+                      <m:t> </m:t>
+                    </m:r>
+                    <m:d>
+                      <m:dPr>
+                        <m:begChr m:val="{"/>
+                        <m:endChr m:val=""/>
+                        <m:ctrlPr>
+                          <a:rPr lang="et-EE" altLang="zh-CN" sz="3200" i="1" dirty="0" smtClean="0">
+                            <a:latin typeface="Cambria Math" panose="02040503050406030204" pitchFamily="18" charset="0"/>
+                            <a:ea typeface="ＭＳ Ｐゴシック" charset="-128"/>
+                          </a:rPr>
+                        </m:ctrlPr>
+                      </m:dPr>
+                      <m:e>
+                        <m:eqArr>
+                          <m:eqArrPr>
+                            <m:ctrlPr>
+                              <a:rPr lang="et-EE" altLang="zh-CN" sz="3200" i="1" dirty="0" smtClean="0">
+                                <a:latin typeface="Cambria Math" panose="02040503050406030204" pitchFamily="18" charset="0"/>
+                                <a:ea typeface="ＭＳ Ｐゴシック" charset="-128"/>
+                              </a:rPr>
+                            </m:ctrlPr>
+                          </m:eqArrPr>
+                          <m:e>
+                            <m:r>
+                              <a:rPr lang="et-EE" altLang="zh-CN" sz="3200" b="0" i="1" dirty="0" smtClean="0">
+                                <a:latin typeface="Cambria Math" panose="02040503050406030204" pitchFamily="18" charset="0"/>
+                                <a:ea typeface="ＭＳ Ｐゴシック" charset="-128"/>
+                              </a:rPr>
+                              <m:t>𝑑</m:t>
+                            </m:r>
+                            <m:d>
+                              <m:dPr>
+                                <m:ctrlPr>
+                                  <a:rPr lang="et-EE" altLang="zh-CN" sz="3200" b="0" i="1" dirty="0" smtClean="0">
+                                    <a:latin typeface="Cambria Math" panose="02040503050406030204" pitchFamily="18" charset="0"/>
+                                    <a:ea typeface="ＭＳ Ｐゴシック" charset="-128"/>
+                                  </a:rPr>
+                                </m:ctrlPr>
+                              </m:dPr>
+                              <m:e>
+                                <m:r>
+                                  <a:rPr lang="et-EE" altLang="zh-CN" sz="3200" b="0" i="1" dirty="0" smtClean="0">
+                                    <a:latin typeface="Cambria Math" panose="02040503050406030204" pitchFamily="18" charset="0"/>
+                                    <a:ea typeface="ＭＳ Ｐゴシック" charset="-128"/>
+                                  </a:rPr>
+                                  <m:t>𝑖</m:t>
+                                </m:r>
+                                <m:r>
+                                  <a:rPr lang="et-EE" altLang="zh-CN" sz="3200" b="0" i="1" dirty="0" smtClean="0">
+                                    <a:latin typeface="Cambria Math" panose="02040503050406030204" pitchFamily="18" charset="0"/>
+                                    <a:ea typeface="ＭＳ Ｐゴシック" charset="-128"/>
+                                  </a:rPr>
+                                  <m:t>−1, </m:t>
+                                </m:r>
+                                <m:r>
+                                  <a:rPr lang="et-EE" altLang="zh-CN" sz="3200" b="0" i="1" dirty="0" smtClean="0">
+                                    <a:latin typeface="Cambria Math" panose="02040503050406030204" pitchFamily="18" charset="0"/>
+                                    <a:ea typeface="ＭＳ Ｐゴシック" charset="-128"/>
+                                  </a:rPr>
+                                  <m:t>𝑗</m:t>
+                                </m:r>
+                                <m:r>
+                                  <a:rPr lang="et-EE" altLang="zh-CN" sz="3200" b="0" i="1" dirty="0" smtClean="0">
+                                    <a:latin typeface="Cambria Math" panose="02040503050406030204" pitchFamily="18" charset="0"/>
+                                    <a:ea typeface="ＭＳ Ｐゴシック" charset="-128"/>
+                                  </a:rPr>
+                                  <m:t>−1</m:t>
+                                </m:r>
+                              </m:e>
+                            </m:d>
+                            <m:r>
+                              <a:rPr lang="et-EE" altLang="zh-CN" sz="3200" b="0" i="1" dirty="0" smtClean="0">
+                                <a:latin typeface="Cambria Math" panose="02040503050406030204" pitchFamily="18" charset="0"/>
+                                <a:ea typeface="ＭＳ Ｐゴシック" charset="-128"/>
+                              </a:rPr>
+                              <m:t>.</m:t>
+                            </m:r>
+                          </m:e>
+                          <m:e>
+                            <m:r>
+                              <a:rPr lang="et-EE" altLang="zh-CN" sz="3200" b="0" i="1" dirty="0" smtClean="0">
+                                <a:latin typeface="Cambria Math" panose="02040503050406030204" pitchFamily="18" charset="0"/>
+                                <a:ea typeface="ＭＳ Ｐゴシック" charset="-128"/>
+                              </a:rPr>
+                              <m:t>𝑑</m:t>
+                            </m:r>
+                            <m:d>
+                              <m:dPr>
+                                <m:ctrlPr>
+                                  <a:rPr lang="et-EE" altLang="zh-CN" sz="3200" b="0" i="1" dirty="0" smtClean="0">
+                                    <a:latin typeface="Cambria Math" panose="02040503050406030204" pitchFamily="18" charset="0"/>
+                                    <a:ea typeface="ＭＳ Ｐゴシック" charset="-128"/>
+                                  </a:rPr>
+                                </m:ctrlPr>
+                              </m:dPr>
+                              <m:e>
+                                <m:r>
+                                  <a:rPr lang="et-EE" altLang="zh-CN" sz="3200" b="0" i="1" dirty="0" smtClean="0">
+                                    <a:latin typeface="Cambria Math" panose="02040503050406030204" pitchFamily="18" charset="0"/>
+                                    <a:ea typeface="ＭＳ Ｐゴシック" charset="-128"/>
+                                  </a:rPr>
+                                  <m:t>𝑖</m:t>
+                                </m:r>
+                                <m:r>
+                                  <a:rPr lang="et-EE" altLang="zh-CN" sz="3200" b="0" i="1" dirty="0" smtClean="0">
+                                    <a:latin typeface="Cambria Math" panose="02040503050406030204" pitchFamily="18" charset="0"/>
+                                    <a:ea typeface="ＭＳ Ｐゴシック" charset="-128"/>
+                                  </a:rPr>
+                                  <m:t>−1, </m:t>
+                                </m:r>
+                                <m:r>
+                                  <a:rPr lang="et-EE" altLang="zh-CN" sz="3200" b="0" i="1" dirty="0" smtClean="0">
+                                    <a:latin typeface="Cambria Math" panose="02040503050406030204" pitchFamily="18" charset="0"/>
+                                    <a:ea typeface="ＭＳ Ｐゴシック" charset="-128"/>
+                                  </a:rPr>
+                                  <m:t>𝑗</m:t>
+                                </m:r>
+                              </m:e>
+                            </m:d>
+                            <m:r>
+                              <a:rPr lang="et-EE" altLang="zh-CN" sz="3200" b="0" i="1" dirty="0" smtClean="0">
+                                <a:latin typeface="Cambria Math" panose="02040503050406030204" pitchFamily="18" charset="0"/>
+                                <a:ea typeface="ＭＳ Ｐゴシック" charset="-128"/>
+                              </a:rPr>
+                              <m:t>,</m:t>
+                            </m:r>
+                          </m:e>
+                          <m:e>
+                            <m:r>
+                              <a:rPr lang="et-EE" altLang="zh-CN" sz="3200" b="0" i="1" dirty="0" smtClean="0">
+                                <a:latin typeface="Cambria Math" panose="02040503050406030204" pitchFamily="18" charset="0"/>
+                                <a:ea typeface="ＭＳ Ｐゴシック" charset="-128"/>
+                              </a:rPr>
+                              <m:t>𝑑</m:t>
+                            </m:r>
+                            <m:d>
+                              <m:dPr>
+                                <m:ctrlPr>
+                                  <a:rPr lang="et-EE" altLang="zh-CN" sz="3200" b="0" i="1" dirty="0" smtClean="0">
+                                    <a:latin typeface="Cambria Math" panose="02040503050406030204" pitchFamily="18" charset="0"/>
+                                    <a:ea typeface="ＭＳ Ｐゴシック" charset="-128"/>
+                                  </a:rPr>
+                                </m:ctrlPr>
+                              </m:dPr>
+                              <m:e>
+                                <m:r>
+                                  <a:rPr lang="et-EE" altLang="zh-CN" sz="3200" b="0" i="1" dirty="0" smtClean="0">
+                                    <a:latin typeface="Cambria Math" panose="02040503050406030204" pitchFamily="18" charset="0"/>
+                                    <a:ea typeface="ＭＳ Ｐゴシック" charset="-128"/>
+                                  </a:rPr>
+                                  <m:t>𝑖</m:t>
+                                </m:r>
+                                <m:r>
+                                  <a:rPr lang="et-EE" altLang="zh-CN" sz="3200" b="0" i="1" dirty="0" smtClean="0">
+                                    <a:latin typeface="Cambria Math" panose="02040503050406030204" pitchFamily="18" charset="0"/>
+                                    <a:ea typeface="ＭＳ Ｐゴシック" charset="-128"/>
+                                  </a:rPr>
+                                  <m:t>, </m:t>
+                                </m:r>
+                                <m:r>
+                                  <a:rPr lang="et-EE" altLang="zh-CN" sz="3200" b="0" i="1" dirty="0" smtClean="0">
+                                    <a:latin typeface="Cambria Math" panose="02040503050406030204" pitchFamily="18" charset="0"/>
+                                    <a:ea typeface="ＭＳ Ｐゴシック" charset="-128"/>
+                                  </a:rPr>
+                                  <m:t>𝑗</m:t>
+                                </m:r>
+                                <m:r>
+                                  <a:rPr lang="et-EE" altLang="zh-CN" sz="3200" b="0" i="1" dirty="0" smtClean="0">
+                                    <a:latin typeface="Cambria Math" panose="02040503050406030204" pitchFamily="18" charset="0"/>
+                                    <a:ea typeface="ＭＳ Ｐゴシック" charset="-128"/>
+                                  </a:rPr>
+                                  <m:t>−1</m:t>
+                                </m:r>
+                              </m:e>
+                            </m:d>
+                            <m:r>
+                              <a:rPr lang="et-EE" altLang="zh-CN" sz="3200" b="0" i="1" dirty="0" smtClean="0">
+                                <a:latin typeface="Cambria Math" panose="02040503050406030204" pitchFamily="18" charset="0"/>
+                                <a:ea typeface="ＭＳ Ｐゴシック" charset="-128"/>
+                              </a:rPr>
+                              <m:t>.</m:t>
+                            </m:r>
+                          </m:e>
+                        </m:eqArr>
+                      </m:e>
+                    </m:d>
+                  </m:oMath>
+                </a14:m>
+                <a:endParaRPr lang="en-US" altLang="zh-CN" sz="3200" dirty="0">
                   <a:solidFill>
                     <a:schemeClr val="tx1"/>
                   </a:solidFill>
                   <a:ea typeface="ＭＳ Ｐゴシック" charset="-128"/>
-                </a:endParaRPr>
-              </a:p>
-              <a:p>
-                <a:pPr marL="0" lvl="1" algn="just">
-                  <a:lnSpc>
-                    <a:spcPct val="120000"/>
-                  </a:lnSpc>
-                  <a:buFontTx/>
-                  <a:buChar char="•"/>
-                </a:pPr>
-                <a:endParaRPr lang="en-US" altLang="zh-CN" sz="2700" dirty="0">
-                  <a:solidFill>
-                    <a:schemeClr val="tx1"/>
-                  </a:solidFill>
-                  <a:ea typeface="SimSun" pitchFamily="2" charset="-122"/>
                 </a:endParaRPr>
               </a:p>
             </p:txBody>
@@ -5094,16 +5380,16 @@
             </p:nvSpPr>
             <p:spPr bwMode="auto">
               <a:xfrm>
-                <a:off x="908050" y="23378413"/>
-                <a:ext cx="11004710" cy="6530159"/>
+                <a:off x="908050" y="22751675"/>
+                <a:ext cx="11033820" cy="7350667"/>
               </a:xfrm>
               <a:prstGeom prst="rect">
                 <a:avLst/>
               </a:prstGeom>
-              <a:blipFill rotWithShape="1">
+              <a:blipFill rotWithShape="0">
                 <a:blip r:embed="rId3"/>
                 <a:stretch>
-                  <a:fillRect/>
+                  <a:fillRect l="-276" r="-552"/>
                 </a:stretch>
               </a:blipFill>
               <a:ln w="57150" cmpd="thinThick">
@@ -5117,7 +5403,7 @@
               <a:lstStyle/>
               <a:p>
                 <a:r>
-                  <a:rPr lang="en-US">
+                  <a:rPr lang="et-EE">
                     <a:noFill/>
                   </a:rPr>
                   <a:t> </a:t>
@@ -5135,7 +5421,7 @@
         </p:nvGrpSpPr>
         <p:grpSpPr>
           <a:xfrm>
-            <a:off x="831850" y="22224206"/>
+            <a:off x="908050" y="21802816"/>
             <a:ext cx="10992689" cy="819989"/>
             <a:chOff x="1066799" y="5958162"/>
             <a:chExt cx="11007725" cy="891580"/>
@@ -5529,7 +5815,7 @@
           </a:ln>
           <a:extLst>
             <a:ext uri="{AF507438-7753-43e0-B8FC-AC1667EBCBE1}">
-              <a14:hiddenEffects xmlns:a14="http://schemas.microsoft.com/office/drawing/2010/main">
+              <a14:hiddenEffects xmlns:a14="http://schemas.microsoft.com/office/drawing/2010/main" xmlns="">
                 <a:effectLst>
                   <a:outerShdw dist="35921" dir="2700000" algn="ctr" rotWithShape="0">
                     <a:schemeClr val="bg2"/>
@@ -5731,89 +6017,68 @@
               <a:rPr lang="et-EE" altLang="ja-JP" sz="3600" dirty="0" smtClean="0">
                 <a:ea typeface="ＭＳ Ｐゴシック" charset="-128"/>
               </a:rPr>
-              <a:t>. Most important window </a:t>
+              <a:t>. Most important window constraints are </a:t>
+            </a:r>
+            <a:r>
+              <a:rPr lang="et-EE" altLang="ja-JP" sz="3600" b="1" dirty="0" smtClean="0">
+                <a:ea typeface="ＭＳ Ｐゴシック" charset="-128"/>
+              </a:rPr>
+              <a:t>Sakoe</a:t>
+            </a:r>
+            <a:r>
+              <a:rPr lang="et-EE" altLang="ja-JP" sz="3600" b="1" dirty="0">
+                <a:ea typeface="ＭＳ Ｐゴシック" charset="-128"/>
+              </a:rPr>
+              <a:t>-</a:t>
+            </a:r>
+            <a:r>
+              <a:rPr lang="et-EE" altLang="ja-JP" sz="3600" b="1" dirty="0" smtClean="0">
+                <a:ea typeface="ＭＳ Ｐゴシック" charset="-128"/>
+              </a:rPr>
+              <a:t>Chiba Band </a:t>
+            </a:r>
+            <a:r>
+              <a:rPr lang="et-EE" altLang="ja-JP" sz="3600" dirty="0">
+                <a:ea typeface="ＭＳ Ｐゴシック" charset="-128"/>
+              </a:rPr>
+              <a:t>[SC78</a:t>
             </a:r>
             <a:r>
               <a:rPr lang="et-EE" altLang="ja-JP" sz="3600" dirty="0" smtClean="0">
                 <a:ea typeface="ＭＳ Ｐゴシック" charset="-128"/>
               </a:rPr>
-              <a:t>constraints are</a:t>
+              <a:t>], </a:t>
+            </a:r>
+            <a:r>
+              <a:rPr lang="et-EE" altLang="ja-JP" sz="3600" b="1" dirty="0" smtClean="0">
+                <a:ea typeface="ＭＳ Ｐゴシック" charset="-128"/>
+              </a:rPr>
+              <a:t>Itakura Parallelogram </a:t>
+            </a:r>
+            <a:r>
+              <a:rPr lang="et-EE" altLang="ja-JP" sz="3600" dirty="0">
+                <a:ea typeface="ＭＳ Ｐゴシック" charset="-128"/>
+              </a:rPr>
+              <a:t>[Ita75</a:t>
             </a:r>
             <a:r>
               <a:rPr lang="et-EE" altLang="ja-JP" sz="3600" dirty="0" smtClean="0">
                 <a:ea typeface="ＭＳ Ｐゴシック" charset="-128"/>
               </a:rPr>
+              <a:t>], </a:t>
+            </a:r>
+            <a:r>
+              <a:rPr lang="et-EE" altLang="ja-JP" sz="3600" b="1" dirty="0">
+                <a:ea typeface="ＭＳ Ｐゴシック" charset="-128"/>
+              </a:rPr>
               <a:t> </a:t>
             </a:r>
             <a:r>
               <a:rPr lang="et-EE" altLang="ja-JP" sz="3600" b="1" dirty="0" smtClean="0">
                 <a:ea typeface="ＭＳ Ｐゴシック" charset="-128"/>
               </a:rPr>
-              <a:t>Sakoe</a:t>
-            </a:r>
-            <a:r>
-              <a:rPr lang="et-EE" altLang="ja-JP" sz="3600" b="1" dirty="0">
-                <a:ea typeface="ＭＳ Ｐゴシック" charset="-128"/>
-              </a:rPr>
-              <a:t>-</a:t>
-            </a:r>
-            <a:r>
-              <a:rPr lang="et-EE" altLang="ja-JP" sz="3600" b="1" dirty="0" smtClean="0">
-                <a:ea typeface="ＭＳ Ｐゴシック" charset="-128"/>
-              </a:rPr>
-              <a:t>Chiba </a:t>
-            </a:r>
-            <a:r>
-              <a:rPr lang="et-EE" altLang="ja-JP" sz="3600" b="1" dirty="0" smtClean="0">
-                <a:ea typeface="ＭＳ Ｐゴシック" charset="-128"/>
-              </a:rPr>
-              <a:t>Band </a:t>
-            </a:r>
-            <a:r>
-              <a:rPr lang="et-EE" altLang="ja-JP" sz="3600" dirty="0">
-                <a:ea typeface="ＭＳ Ｐゴシック" charset="-128"/>
-              </a:rPr>
-              <a:t>[SC78</a:t>
-            </a:r>
-            <a:r>
-              <a:rPr lang="et-EE" altLang="ja-JP" sz="3600" dirty="0" smtClean="0">
-                <a:ea typeface="ＭＳ Ｐゴシック" charset="-128"/>
-              </a:rPr>
-              <a:t>], </a:t>
-            </a:r>
-            <a:r>
-              <a:rPr lang="et-EE" altLang="ja-JP" sz="3600" b="1" dirty="0" smtClean="0">
-                <a:ea typeface="ＭＳ Ｐゴシック" charset="-128"/>
-              </a:rPr>
-              <a:t>Itakura Parallelogram </a:t>
-            </a:r>
-            <a:r>
-              <a:rPr lang="et-EE" altLang="ja-JP" sz="3600" dirty="0">
-                <a:ea typeface="ＭＳ Ｐゴシック" charset="-128"/>
-              </a:rPr>
-              <a:t>[Ita75</a:t>
-            </a:r>
-            <a:r>
-              <a:rPr lang="et-EE" altLang="ja-JP" sz="3600" dirty="0" smtClean="0">
-                <a:ea typeface="ＭＳ Ｐゴシック" charset="-128"/>
-              </a:rPr>
-              <a:t>], </a:t>
-            </a:r>
-            <a:r>
-              <a:rPr lang="et-EE" altLang="ja-JP" sz="3600" b="1" dirty="0">
-                <a:ea typeface="ＭＳ Ｐゴシック" charset="-128"/>
-              </a:rPr>
-              <a:t> </a:t>
-            </a:r>
-            <a:r>
-              <a:rPr lang="et-EE" altLang="ja-JP" sz="3600" b="1" dirty="0" smtClean="0">
-                <a:ea typeface="ＭＳ Ｐゴシック" charset="-128"/>
-              </a:rPr>
               <a:t>Slanted Band. </a:t>
             </a:r>
-            <a:endParaRPr lang="et-EE" altLang="ja-JP" sz="3600" b="1" dirty="0" smtClean="0">
-              <a:ea typeface="ＭＳ Ｐゴシック" charset="-128"/>
-            </a:endParaRPr>
           </a:p>
         </p:txBody>
       </p:sp>
@@ -5839,14 +6104,14 @@
           </a:ln>
           <a:extLst>
             <a:ext uri="{909E8E84-426E-40dd-AFC4-6F175D3DCCD1}">
-              <a14:hiddenFill xmlns:a14="http://schemas.microsoft.com/office/drawing/2010/main">
+              <a14:hiddenFill xmlns:a14="http://schemas.microsoft.com/office/drawing/2010/main" xmlns="">
                 <a:solidFill>
                   <a:schemeClr val="accent1"/>
                 </a:solidFill>
               </a14:hiddenFill>
             </a:ext>
             <a:ext uri="{91240B29-F687-4f45-9708-019B960494DF}">
-              <a14:hiddenLine xmlns:a14="http://schemas.microsoft.com/office/drawing/2010/main" w="9525">
+              <a14:hiddenLine xmlns:a14="http://schemas.microsoft.com/office/drawing/2010/main" xmlns="" w="9525">
                 <a:solidFill>
                   <a:schemeClr val="tx1"/>
                 </a:solidFill>
@@ -5856,7 +6121,7 @@
               </a14:hiddenLine>
             </a:ext>
             <a:ext uri="{AF507438-7753-43e0-B8FC-AC1667EBCBE1}">
-              <a14:hiddenEffects xmlns:a14="http://schemas.microsoft.com/office/drawing/2010/main">
+              <a14:hiddenEffects xmlns:a14="http://schemas.microsoft.com/office/drawing/2010/main" xmlns="">
                 <a:effectLst>
                   <a:outerShdw dist="17961" dir="2700000" algn="ctr" rotWithShape="0">
                     <a:srgbClr val="FFFFFF"/>
@@ -6032,14 +6297,14 @@
           </a:ln>
           <a:extLst>
             <a:ext uri="{909E8E84-426E-40dd-AFC4-6F175D3DCCD1}">
-              <a14:hiddenFill xmlns:a14="http://schemas.microsoft.com/office/drawing/2010/main">
+              <a14:hiddenFill xmlns:a14="http://schemas.microsoft.com/office/drawing/2010/main" xmlns="">
                 <a:solidFill>
                   <a:schemeClr val="accent1"/>
                 </a:solidFill>
               </a14:hiddenFill>
             </a:ext>
             <a:ext uri="{91240B29-F687-4f45-9708-019B960494DF}">
-              <a14:hiddenLine xmlns:a14="http://schemas.microsoft.com/office/drawing/2010/main" w="9525">
+              <a14:hiddenLine xmlns:a14="http://schemas.microsoft.com/office/drawing/2010/main" xmlns="" w="9525">
                 <a:solidFill>
                   <a:schemeClr val="tx1"/>
                 </a:solidFill>
@@ -6049,7 +6314,7 @@
               </a14:hiddenLine>
             </a:ext>
             <a:ext uri="{AF507438-7753-43e0-B8FC-AC1667EBCBE1}">
-              <a14:hiddenEffects xmlns:a14="http://schemas.microsoft.com/office/drawing/2010/main">
+              <a14:hiddenEffects xmlns:a14="http://schemas.microsoft.com/office/drawing/2010/main" xmlns="">
                 <a:effectLst>
                   <a:outerShdw dist="17961" dir="2700000" algn="ctr" rotWithShape="0">
                     <a:srgbClr val="FFFFFF"/>
@@ -6201,18 +6466,7 @@
                 </a:solidFill>
                 <a:latin typeface="Arial"/>
               </a:rPr>
-              <a:t>difference, 5</a:t>
-            </a:r>
-            <a:r>
-              <a:rPr lang="et-EE" i="1" dirty="0" smtClean="0">
-                <a:solidFill>
-                  <a:schemeClr val="accent2">
-                    <a:lumMod val="50000"/>
-                  </a:schemeClr>
-                </a:solidFill>
-                <a:latin typeface="Arial"/>
-              </a:rPr>
-              <a:t>%</a:t>
+              <a:t>difference, 5%</a:t>
             </a:r>
             <a:endParaRPr lang="en-AU" i="1" dirty="0">
               <a:solidFill>
@@ -6235,8 +6489,8 @@
         </p:nvSpPr>
         <p:spPr bwMode="auto">
           <a:xfrm>
-            <a:off x="31250830" y="22751675"/>
-            <a:ext cx="10623135" cy="7156897"/>
+            <a:off x="31250830" y="22945446"/>
+            <a:ext cx="10623135" cy="7156896"/>
           </a:xfrm>
           <a:prstGeom prst="rect">
             <a:avLst/>
@@ -6250,7 +6504,7 @@
           </a:ln>
           <a:extLst>
             <a:ext uri="{AF507438-7753-43e0-B8FC-AC1667EBCBE1}">
-              <a14:hiddenEffects xmlns:a14="http://schemas.microsoft.com/office/drawing/2010/main">
+              <a14:hiddenEffects xmlns:a14="http://schemas.microsoft.com/office/drawing/2010/main" xmlns="">
                 <a:effectLst>
                   <a:outerShdw dist="35921" dir="2700000" algn="ctr" rotWithShape="0">
                     <a:schemeClr val="bg2"/>
@@ -6371,13 +6625,13 @@
               <a:rPr lang="et-EE" altLang="zh-CN" sz="3600" dirty="0" smtClean="0">
                 <a:ea typeface="SimSun" pitchFamily="2" charset="-122"/>
               </a:rPr>
-              <a:t>[Ita75</a:t>
+              <a:t>[Ita75] </a:t>
             </a:r>
             <a:r>
               <a:rPr lang="et-EE" altLang="zh-CN" sz="3600" dirty="0" smtClean="0">
                 <a:ea typeface="SimSun" pitchFamily="2" charset="-122"/>
               </a:rPr>
-              <a:t>]  </a:t>
+              <a:t>	</a:t>
             </a:r>
             <a:r>
               <a:rPr lang="en-US" sz="3600" dirty="0" smtClean="0"/>
@@ -6393,11 +6647,15 @@
             </a:r>
             <a:r>
               <a:rPr lang="en-US" sz="3600" dirty="0" smtClean="0"/>
-              <a:t>. Minimum prediction </a:t>
+              <a:t>. Minimum prediction residual   </a:t>
+            </a:r>
+            <a:r>
+              <a:rPr lang="et-EE" sz="3600" dirty="0" smtClean="0"/>
+              <a:t>			</a:t>
             </a:r>
             <a:r>
               <a:rPr lang="en-US" sz="3600" dirty="0" smtClean="0"/>
-              <a:t>residual    				principle </a:t>
+              <a:t>principle </a:t>
             </a:r>
             <a:r>
               <a:rPr lang="en-US" sz="3600" dirty="0" smtClean="0"/>
@@ -6409,22 +6667,38 @@
             </a:r>
             <a:r>
               <a:rPr lang="en-US" sz="3600" dirty="0" smtClean="0"/>
-              <a:t>recognition. IEEE </a:t>
+              <a:t>recognition.</a:t>
             </a:r>
             <a:r>
               <a:rPr lang="et-EE" sz="3600" dirty="0" smtClean="0"/>
-              <a:t>		</a:t>
+              <a:t> 			</a:t>
             </a:r>
             <a:r>
               <a:rPr lang="en-US" sz="3600" dirty="0" smtClean="0"/>
-              <a:t>Transactions on Acoustics, Speech, </a:t>
+              <a:t>IEEE</a:t>
+            </a:r>
+            <a:r>
+              <a:rPr lang="et-EE" sz="3600" dirty="0" smtClean="0"/>
+              <a:t> </a:t>
+            </a:r>
+            <a:r>
+              <a:rPr lang="en-US" sz="3600" dirty="0" smtClean="0"/>
+              <a:t>Transactions </a:t>
+            </a:r>
+            <a:r>
+              <a:rPr lang="en-US" sz="3600" dirty="0" smtClean="0"/>
+              <a:t>on Acoustics, Speech, </a:t>
+            </a:r>
+            <a:r>
+              <a:rPr lang="et-EE" sz="3600" dirty="0" smtClean="0"/>
+              <a:t>			</a:t>
             </a:r>
             <a:r>
               <a:rPr lang="en-US" sz="3600" dirty="0" smtClean="0"/>
               <a:t>and</a:t>
             </a:r>
             <a:r>
-              <a:rPr lang="et-EE" sz="3600" dirty="0"/>
+              <a:rPr lang="et-EE" sz="3600" dirty="0" smtClean="0"/>
               <a:t> </a:t>
             </a:r>
             <a:r>
@@ -6436,8 +6710,24 @@
               <a:t> </a:t>
             </a:r>
             <a:r>
+              <a:rPr lang="et-EE" sz="3600" dirty="0" err="1" smtClean="0"/>
+              <a:t>Processing</a:t>
+            </a:r>
+            <a:r>
               <a:rPr lang="et-EE" sz="3600" dirty="0" smtClean="0"/>
-              <a:t>Processing, 23(1):67-72, Feb 1975.</a:t>
+              <a:t>, 23(1</a:t>
+            </a:r>
+            <a:r>
+              <a:rPr lang="et-EE" sz="3600" dirty="0" smtClean="0"/>
+              <a:t>):67-72, </a:t>
+            </a:r>
+            <a:r>
+              <a:rPr lang="et-EE" sz="3600" dirty="0" smtClean="0"/>
+              <a:t>1975</a:t>
+            </a:r>
+            <a:r>
+              <a:rPr lang="et-EE" sz="3600" dirty="0" smtClean="0"/>
+              <a:t>.</a:t>
             </a:r>
             <a:endParaRPr lang="et-EE" altLang="zh-CN" sz="3600" dirty="0" smtClean="0">
               <a:ea typeface="SimSun" pitchFamily="2" charset="-122"/>
@@ -6446,46 +6736,80 @@
           <a:p>
             <a:pPr algn="just"/>
             <a:r>
-              <a:rPr lang="et-EE" altLang="zh-CN" sz="3600" dirty="0" smtClean="0">
-                <a:ea typeface="SimSun" pitchFamily="2" charset="-122"/>
-              </a:rPr>
-              <a:t>[SC78]	</a:t>
-            </a:r>
-            <a:r>
-              <a:rPr lang="et-EE" sz="3600" dirty="0" err="1" smtClean="0"/>
-              <a:t>Hiroaki</a:t>
+              <a:rPr lang="et-EE" sz="3600" dirty="0" smtClean="0"/>
+              <a:t>[</a:t>
+            </a:r>
+            <a:r>
+              <a:rPr lang="et-EE" sz="3600" dirty="0" smtClean="0"/>
+              <a:t>SC71]	</a:t>
+            </a:r>
+            <a:r>
+              <a:rPr lang="en-US" sz="3600" dirty="0" smtClean="0"/>
+              <a:t>Hiroaki </a:t>
+            </a:r>
+            <a:r>
+              <a:rPr lang="en-US" sz="3600" dirty="0" err="1" smtClean="0"/>
+              <a:t>Sakoe</a:t>
+            </a:r>
+            <a:r>
+              <a:rPr lang="en-US" sz="3600" dirty="0" smtClean="0"/>
+              <a:t> and </a:t>
+            </a:r>
+            <a:r>
+              <a:rPr lang="en-US" sz="3600" dirty="0" err="1" smtClean="0"/>
+              <a:t>Seibi</a:t>
+            </a:r>
+            <a:r>
+              <a:rPr lang="en-US" sz="3600" dirty="0" smtClean="0"/>
+              <a:t> Chiba. </a:t>
             </a:r>
             <a:r>
               <a:rPr lang="et-EE" sz="3600" dirty="0" smtClean="0"/>
               <a:t> </a:t>
             </a:r>
             <a:r>
+              <a:rPr lang="en-US" sz="3600" dirty="0" smtClean="0"/>
+              <a:t>A dynamic</a:t>
+            </a:r>
+            <a:r>
+              <a:rPr lang="et-EE" sz="3600" dirty="0" smtClean="0"/>
+              <a:t> 			</a:t>
+            </a:r>
+            <a:r>
+              <a:rPr lang="en-US" sz="3600" dirty="0" smtClean="0"/>
+              <a:t>programming approach</a:t>
+            </a:r>
+            <a:r>
+              <a:rPr lang="et-EE" sz="3600" dirty="0" smtClean="0"/>
+              <a:t> t</a:t>
+            </a:r>
+            <a:r>
+              <a:rPr lang="en-US" sz="3600" dirty="0" smtClean="0"/>
+              <a:t>o continuous speech </a:t>
+            </a:r>
+            <a:r>
+              <a:rPr lang="et-EE" sz="3600" dirty="0" smtClean="0"/>
+              <a:t>		</a:t>
+            </a:r>
+            <a:r>
+              <a:rPr lang="en-US" sz="3600" dirty="0" smtClean="0"/>
+              <a:t>recognition. In Proceedings of the </a:t>
+            </a:r>
+            <a:r>
+              <a:rPr lang="en-US" sz="3600" dirty="0" smtClean="0"/>
+              <a:t>Seventh</a:t>
+            </a:r>
+            <a:r>
+              <a:rPr lang="et-EE" sz="3600" dirty="0" smtClean="0"/>
+              <a:t> 			</a:t>
+            </a:r>
+            <a:r>
+              <a:rPr lang="en-US" sz="3600" dirty="0" smtClean="0"/>
+              <a:t>In</a:t>
+            </a:r>
+            <a:r>
               <a:rPr lang="et-EE" sz="3600" dirty="0" err="1" smtClean="0"/>
-              <a:t>Sakoe</a:t>
-            </a:r>
-            <a:r>
-              <a:rPr lang="et-EE" sz="3600" dirty="0" smtClean="0"/>
-              <a:t> and Seibi </a:t>
-            </a:r>
-            <a:r>
-              <a:rPr lang="et-EE" sz="3600" dirty="0" err="1" smtClean="0"/>
-              <a:t>Chiba</a:t>
-            </a:r>
-            <a:r>
-              <a:rPr lang="et-EE" sz="3600" dirty="0" smtClean="0"/>
-              <a:t>. </a:t>
-            </a:r>
-            <a:r>
-              <a:rPr lang="et-EE" sz="3600" dirty="0" err="1" smtClean="0"/>
-              <a:t>Dynamic</a:t>
-            </a:r>
-            <a:r>
-              <a:rPr lang="et-EE" sz="3600" dirty="0" smtClean="0"/>
-              <a:t>   			</a:t>
-            </a:r>
-            <a:r>
-              <a:rPr lang="et-EE" sz="3600" dirty="0" err="1" smtClean="0"/>
-              <a:t>programming</a:t>
+              <a:t>ternational</a:t>
             </a:r>
             <a:r>
               <a:rPr lang="et-EE" sz="3600" dirty="0" smtClean="0"/>
@@ -6493,123 +6817,110 @@
             </a:r>
             <a:r>
               <a:rPr lang="et-EE" sz="3600" dirty="0" err="1" smtClean="0"/>
-              <a:t>algorithm</a:t>
+              <a:t>Congress</a:t>
+            </a:r>
+            <a:r>
+              <a:rPr lang="et-EE" sz="3600" dirty="0" smtClean="0"/>
+              <a:t> on </a:t>
+            </a:r>
+            <a:r>
+              <a:rPr lang="et-EE" sz="3600" dirty="0" err="1" smtClean="0"/>
+              <a:t>Acoustics</a:t>
+            </a:r>
+            <a:r>
+              <a:rPr lang="et-EE" sz="3600" dirty="0" smtClean="0"/>
+              <a:t>, Buda- 			</a:t>
+            </a:r>
+            <a:r>
+              <a:rPr lang="et-EE" sz="3600" dirty="0" err="1" smtClean="0"/>
+              <a:t>pest,volume</a:t>
             </a:r>
             <a:r>
               <a:rPr lang="et-EE" sz="3600" dirty="0" smtClean="0"/>
               <a:t> </a:t>
             </a:r>
             <a:r>
-              <a:rPr lang="en-US" sz="3600" dirty="0" smtClean="0"/>
-              <a:t>optimization for </a:t>
-            </a:r>
-            <a:r>
               <a:rPr lang="et-EE" sz="3600" dirty="0" smtClean="0"/>
-              <a:t>			</a:t>
-            </a:r>
-            <a:r>
-              <a:rPr lang="en-US" sz="3600" dirty="0" smtClean="0"/>
-              <a:t>spoken word recognition, 1978.</a:t>
-            </a:r>
-            <a:endParaRPr lang="et-EE" sz="3600" dirty="0" smtClean="0"/>
+              <a:t>3, pages 65-69, Budapest, 1971</a:t>
+            </a:r>
+            <a:r>
+              <a:rPr lang="et-EE" sz="3600" dirty="0" smtClean="0"/>
+              <a:t>.</a:t>
+            </a:r>
           </a:p>
           <a:p>
             <a:pPr algn="just"/>
             <a:r>
-              <a:rPr lang="et-EE" sz="3600" dirty="0" smtClean="0"/>
-              <a:t>[SC71]	</a:t>
+              <a:rPr lang="et-EE" altLang="zh-CN" sz="3600" dirty="0">
+                <a:ea typeface="SimSun" pitchFamily="2" charset="-122"/>
+              </a:rPr>
+              <a:t>[SC78]	</a:t>
+            </a:r>
+            <a:r>
+              <a:rPr lang="et-EE" sz="3600" dirty="0" err="1"/>
+              <a:t>Hiroaki</a:t>
+            </a:r>
+            <a:r>
+              <a:rPr lang="et-EE" sz="3600" dirty="0"/>
+              <a:t> </a:t>
+            </a:r>
+            <a:r>
+              <a:rPr lang="et-EE" sz="3600" dirty="0" err="1"/>
+              <a:t>Sakoe</a:t>
+            </a:r>
+            <a:r>
+              <a:rPr lang="et-EE" sz="3600" dirty="0"/>
+              <a:t> and Seibi </a:t>
+            </a:r>
+            <a:r>
+              <a:rPr lang="et-EE" sz="3600" dirty="0" err="1"/>
+              <a:t>Chiba</a:t>
+            </a:r>
+            <a:r>
+              <a:rPr lang="et-EE" sz="3600" dirty="0"/>
+              <a:t>. </a:t>
+            </a:r>
+            <a:r>
+              <a:rPr lang="et-EE" sz="3600" dirty="0" err="1"/>
+              <a:t>Dynamic</a:t>
+            </a:r>
+            <a:r>
+              <a:rPr lang="et-EE" sz="3600" dirty="0"/>
+              <a:t>   			</a:t>
+            </a:r>
+            <a:r>
+              <a:rPr lang="et-EE" sz="3600" dirty="0" err="1"/>
+              <a:t>programming</a:t>
+            </a:r>
+            <a:r>
+              <a:rPr lang="et-EE" sz="3600" dirty="0"/>
+              <a:t> </a:t>
+            </a:r>
+            <a:r>
+              <a:rPr lang="et-EE" sz="3600" dirty="0" err="1"/>
+              <a:t>algorithm</a:t>
+            </a:r>
+            <a:r>
+              <a:rPr lang="et-EE" sz="3600" dirty="0"/>
+              <a:t> </a:t>
+            </a:r>
+            <a:r>
+              <a:rPr lang="en-US" sz="3600" dirty="0"/>
+              <a:t>optimization for </a:t>
+            </a:r>
+            <a:r>
+              <a:rPr lang="et-EE" sz="3600" dirty="0"/>
+              <a:t>			</a:t>
+            </a:r>
+            <a:r>
+              <a:rPr lang="en-US" sz="3600" dirty="0"/>
+              <a:t>spoken word recognition, 1978</a:t>
             </a:r>
             <a:r>
               <a:rPr lang="en-US" sz="3600" dirty="0" smtClean="0"/>
-              <a:t>Hiroaki </a:t>
-            </a:r>
-            <a:r>
-              <a:rPr lang="en-US" sz="3600" dirty="0" err="1" smtClean="0"/>
-              <a:t>Sakoe</a:t>
-            </a:r>
-            <a:r>
-              <a:rPr lang="en-US" sz="3600" dirty="0" smtClean="0"/>
-              <a:t> and </a:t>
-            </a:r>
-            <a:r>
-              <a:rPr lang="en-US" sz="3600" dirty="0" err="1" smtClean="0"/>
-              <a:t>Seibi</a:t>
-            </a:r>
-            <a:r>
-              <a:rPr lang="en-US" sz="3600" dirty="0" smtClean="0"/>
-              <a:t> Chiba. </a:t>
-            </a:r>
-            <a:r>
-              <a:rPr lang="et-EE" sz="3600" dirty="0" smtClean="0"/>
-              <a:t> </a:t>
-            </a:r>
-            <a:r>
-              <a:rPr lang="en-US" sz="3600" dirty="0" smtClean="0"/>
-              <a:t>A dynamic</a:t>
-            </a:r>
-            <a:r>
-              <a:rPr lang="et-EE" sz="3600" dirty="0" smtClean="0"/>
-              <a:t> 			</a:t>
-            </a:r>
-            <a:r>
-              <a:rPr lang="en-US" sz="3600" dirty="0" smtClean="0"/>
-              <a:t>programming approach</a:t>
-            </a:r>
-            <a:r>
-              <a:rPr lang="et-EE" sz="3600" dirty="0" smtClean="0"/>
-              <a:t> t</a:t>
-            </a:r>
-            <a:r>
-              <a:rPr lang="en-US" sz="3600" dirty="0" smtClean="0"/>
-              <a:t>o continuous speech </a:t>
-            </a:r>
-            <a:r>
-              <a:rPr lang="et-EE" sz="3600" dirty="0" smtClean="0"/>
-              <a:t>		</a:t>
-            </a:r>
-            <a:r>
-              <a:rPr lang="en-US" sz="3600" dirty="0" smtClean="0"/>
-              <a:t>recognition. In Proceedings of the Seventh In-</a:t>
-            </a:r>
-          </a:p>
-          <a:p>
-            <a:pPr algn="just"/>
-            <a:r>
-              <a:rPr lang="et-EE" sz="3600" dirty="0" smtClean="0"/>
-              <a:t>			</a:t>
-            </a:r>
-            <a:r>
-              <a:rPr lang="et-EE" sz="3600" dirty="0" err="1" smtClean="0"/>
-              <a:t>ternational</a:t>
-            </a:r>
-            <a:r>
-              <a:rPr lang="et-EE" sz="3600" dirty="0" smtClean="0"/>
-              <a:t> </a:t>
-            </a:r>
-            <a:r>
-              <a:rPr lang="et-EE" sz="3600" dirty="0" err="1" smtClean="0"/>
-              <a:t>Congress</a:t>
-            </a:r>
-            <a:r>
-              <a:rPr lang="et-EE" sz="3600" dirty="0" smtClean="0"/>
-              <a:t> on </a:t>
-            </a:r>
-            <a:r>
-              <a:rPr lang="et-EE" sz="3600" dirty="0" err="1" smtClean="0"/>
-              <a:t>Acoustics</a:t>
-            </a:r>
-            <a:r>
-              <a:rPr lang="et-EE" sz="3600" dirty="0" smtClean="0"/>
-              <a:t>, Budapest, 		</a:t>
-            </a:r>
-            <a:r>
-              <a:rPr lang="et-EE" sz="3600" dirty="0" err="1" smtClean="0"/>
-              <a:t>volume</a:t>
-            </a:r>
-            <a:r>
-              <a:rPr lang="et-EE" sz="3600" dirty="0" smtClean="0"/>
-              <a:t> 3, pages 65-69, Budapest, 1971.</a:t>
-            </a:r>
+              <a:t>.</a:t>
+            </a:r>
+            <a:endParaRPr lang="et-EE" sz="3600" dirty="0"/>
           </a:p>
         </p:txBody>
       </p:sp>
@@ -6638,7 +6949,7 @@
           </a:ln>
           <a:extLst>
             <a:ext uri="{AF507438-7753-43e0-B8FC-AC1667EBCBE1}">
-              <a14:hiddenEffects xmlns:a14="http://schemas.microsoft.com/office/drawing/2010/main">
+              <a14:hiddenEffects xmlns:a14="http://schemas.microsoft.com/office/drawing/2010/main" xmlns="">
                 <a:effectLst>
                   <a:outerShdw dist="35921" dir="2700000" algn="ctr" rotWithShape="0">
                     <a:schemeClr val="bg2"/>
@@ -7515,7 +7826,7 @@
         </p:nvGrpSpPr>
         <p:grpSpPr>
           <a:xfrm>
-            <a:off x="31159450" y="21843206"/>
+            <a:off x="31159450" y="21884142"/>
             <a:ext cx="10736991" cy="819990"/>
             <a:chOff x="1066799" y="5958162"/>
             <a:chExt cx="11007725" cy="891580"/>
@@ -7974,14 +8285,14 @@
           </a:ln>
           <a:extLst>
             <a:ext uri="{909E8E84-426E-40dd-AFC4-6F175D3DCCD1}">
-              <a14:hiddenFill xmlns:a14="http://schemas.microsoft.com/office/drawing/2010/main">
+              <a14:hiddenFill xmlns:a14="http://schemas.microsoft.com/office/drawing/2010/main" xmlns="">
                 <a:solidFill>
                   <a:schemeClr val="accent1"/>
                 </a:solidFill>
               </a14:hiddenFill>
             </a:ext>
             <a:ext uri="{91240B29-F687-4f45-9708-019B960494DF}">
-              <a14:hiddenLine xmlns:a14="http://schemas.microsoft.com/office/drawing/2010/main" w="9525">
+              <a14:hiddenLine xmlns:a14="http://schemas.microsoft.com/office/drawing/2010/main" xmlns="" w="9525">
                 <a:solidFill>
                   <a:schemeClr val="tx1"/>
                 </a:solidFill>
@@ -7991,7 +8302,7 @@
               </a14:hiddenLine>
             </a:ext>
             <a:ext uri="{AF507438-7753-43e0-B8FC-AC1667EBCBE1}">
-              <a14:hiddenEffects xmlns:a14="http://schemas.microsoft.com/office/drawing/2010/main">
+              <a14:hiddenEffects xmlns:a14="http://schemas.microsoft.com/office/drawing/2010/main" xmlns="">
                 <a:effectLst>
                   <a:outerShdw dist="17961" dir="2700000" algn="ctr" rotWithShape="0">
                     <a:srgbClr val="FFFFFF"/>
@@ -8234,7 +8545,7 @@
         </p:nvSpPr>
         <p:spPr bwMode="auto">
           <a:xfrm>
-            <a:off x="21726808" y="28244006"/>
+            <a:off x="21786850" y="28244006"/>
             <a:ext cx="9220200" cy="457188"/>
           </a:xfrm>
           <a:prstGeom prst="rect">
@@ -8246,14 +8557,14 @@
           </a:ln>
           <a:extLst>
             <a:ext uri="{909E8E84-426E-40dd-AFC4-6F175D3DCCD1}">
-              <a14:hiddenFill xmlns:a14="http://schemas.microsoft.com/office/drawing/2010/main">
+              <a14:hiddenFill xmlns:a14="http://schemas.microsoft.com/office/drawing/2010/main" xmlns="">
                 <a:solidFill>
                   <a:schemeClr val="accent1"/>
                 </a:solidFill>
               </a14:hiddenFill>
             </a:ext>
             <a:ext uri="{91240B29-F687-4f45-9708-019B960494DF}">
-              <a14:hiddenLine xmlns:a14="http://schemas.microsoft.com/office/drawing/2010/main" w="9525">
+              <a14:hiddenLine xmlns:a14="http://schemas.microsoft.com/office/drawing/2010/main" xmlns="" w="9525">
                 <a:solidFill>
                   <a:schemeClr val="tx1"/>
                 </a:solidFill>
@@ -8263,7 +8574,7 @@
               </a14:hiddenLine>
             </a:ext>
             <a:ext uri="{AF507438-7753-43e0-B8FC-AC1667EBCBE1}">
-              <a14:hiddenEffects xmlns:a14="http://schemas.microsoft.com/office/drawing/2010/main">
+              <a14:hiddenEffects xmlns:a14="http://schemas.microsoft.com/office/drawing/2010/main" xmlns="">
                 <a:effectLst>
                   <a:outerShdw dist="17961" dir="2700000" algn="ctr" rotWithShape="0">
                     <a:srgbClr val="FFFFFF"/>
@@ -8415,10 +8726,10 @@
                 </a:solidFill>
                 <a:latin typeface="Arial"/>
               </a:rPr>
-              <a:t>difference, 10</a:t>
-            </a:r>
-            <a:r>
-              <a:rPr lang="et-EE" i="1" dirty="0" smtClean="0">
+              <a:t>difference, 10%, different </a:t>
+            </a:r>
+            <a:r>
+              <a:rPr lang="et-EE" i="1" dirty="0" err="1" smtClean="0">
                 <a:solidFill>
                   <a:schemeClr val="accent2">
                     <a:lumMod val="50000"/>
@@ -8426,7 +8737,29 @@
                 </a:solidFill>
                 <a:latin typeface="Arial"/>
               </a:rPr>
-              <a:t>%, different length seq-s</a:t>
+              <a:t>length</a:t>
+            </a:r>
+            <a:r>
+              <a:rPr lang="et-EE" i="1" dirty="0" smtClean="0">
+                <a:solidFill>
+                  <a:schemeClr val="accent2">
+                    <a:lumMod val="50000"/>
+                  </a:schemeClr>
+                </a:solidFill>
+                <a:latin typeface="Arial"/>
+              </a:rPr>
+              <a:t> </a:t>
+            </a:r>
+            <a:r>
+              <a:rPr lang="et-EE" i="1" dirty="0" err="1" smtClean="0">
+                <a:solidFill>
+                  <a:schemeClr val="accent2">
+                    <a:lumMod val="50000"/>
+                  </a:schemeClr>
+                </a:solidFill>
+                <a:latin typeface="Arial"/>
+              </a:rPr>
+              <a:t>series</a:t>
             </a:r>
             <a:endParaRPr lang="en-AU" i="1" dirty="0">
               <a:solidFill>
@@ -9194,7 +9527,7 @@
         <p:spPr>
           <a:xfrm>
             <a:off x="908050" y="13422222"/>
-            <a:ext cx="11049000" cy="8350841"/>
+            <a:ext cx="11049000" cy="8228309"/>
           </a:xfrm>
           <a:prstGeom prst="rect">
             <a:avLst/>
@@ -9206,11 +9539,11 @@
   <p:clrMapOvr>
     <a:masterClrMapping/>
   </p:clrMapOvr>
-  <p:transition xmlns:p14="http://schemas.microsoft.com/office/powerpoint/2010/main"/>
+  <p:transition/>
   <p:timing>
     <p:tnLst>
       <p:par>
-        <p:cTn xmlns:p14="http://schemas.microsoft.com/office/powerpoint/2010/main" id="1" dur="indefinite" restart="never" nodeType="tmRoot"/>
+        <p:cTn id="1" dur="indefinite" restart="never" nodeType="tmRoot"/>
       </p:par>
     </p:tnLst>
   </p:timing>
@@ -9481,7 +9814,7 @@
         <a:effectLst/>
         <a:extLst>
           <a:ext uri="{AF507438-7753-43e0-B8FC-AC1667EBCBE1}">
-            <a14:hiddenEffects xmlns:a14="http://schemas.microsoft.com/office/drawing/2010/main">
+            <a14:hiddenEffects xmlns:a14="http://schemas.microsoft.com/office/drawing/2010/main" xmlns="">
               <a:effectLst>
                 <a:outerShdw dist="35921" dir="2700000" algn="ctr" rotWithShape="0">
                   <a:schemeClr val="bg2"/>
@@ -9560,7 +9893,7 @@
         <a:effectLst/>
         <a:extLst>
           <a:ext uri="{AF507438-7753-43e0-B8FC-AC1667EBCBE1}">
-            <a14:hiddenEffects xmlns:a14="http://schemas.microsoft.com/office/drawing/2010/main">
+            <a14:hiddenEffects xmlns:a14="http://schemas.microsoft.com/office/drawing/2010/main" xmlns="">
               <a:effectLst>
                 <a:outerShdw dist="35921" dir="2700000" algn="ctr" rotWithShape="0">
                   <a:schemeClr val="bg2"/>

</xml_diff>

<commit_message>
final version of poster
</commit_message>
<xml_diff>
--- a/poster.pptx
+++ b/poster.pptx
@@ -4548,31 +4548,43 @@
               <a:rPr lang="en-US" altLang="ja-JP" sz="3600" dirty="0">
                 <a:ea typeface="ＭＳ Ｐゴシック" charset="-128"/>
               </a:rPr>
-              <a:t>task of </a:t>
+              <a:t>task </a:t>
+            </a:r>
+            <a:r>
+              <a:rPr lang="en-US" altLang="ja-JP" sz="3600">
+                <a:ea typeface="ＭＳ Ｐゴシック" charset="-128"/>
+              </a:rPr>
+              <a:t>of </a:t>
+            </a:r>
+            <a:r>
+              <a:rPr lang="en-US" altLang="ja-JP" sz="3600" smtClean="0">
+                <a:ea typeface="ＭＳ Ｐゴシック" charset="-128"/>
+              </a:rPr>
+              <a:t>DTW</a:t>
+            </a:r>
+            <a:r>
+              <a:rPr lang="et-EE" altLang="ja-JP" sz="3600" smtClean="0">
+                <a:ea typeface="ＭＳ Ｐゴシック" charset="-128"/>
+              </a:rPr>
+              <a:t> </a:t>
             </a:r>
             <a:r>
               <a:rPr lang="en-US" altLang="ja-JP" sz="3600" dirty="0" smtClean="0">
                 <a:ea typeface="ＭＳ Ｐゴシック" charset="-128"/>
               </a:rPr>
-              <a:t>(</a:t>
+              <a:t>algorithm </a:t>
             </a:r>
             <a:r>
               <a:rPr lang="en-US" altLang="ja-JP" sz="3600" dirty="0">
                 <a:ea typeface="ＭＳ Ｐゴシック" charset="-128"/>
               </a:rPr>
-              <a:t>DTW) algorithm is to measure the similarity between two sequences. DTW algorithm was introduced in </a:t>
+              <a:t>is to measure the similarity between two sequences. DTW algorithm was introduced in </a:t>
             </a:r>
             <a:r>
               <a:rPr lang="et-EE" altLang="ja-JP" sz="3600" dirty="0" smtClean="0">
                 <a:ea typeface="ＭＳ Ｐゴシック" charset="-128"/>
               </a:rPr>
-              <a:t>[</a:t>
-            </a:r>
-            <a:r>
-              <a:rPr lang="et-EE" altLang="ja-JP" sz="3600" dirty="0" smtClean="0">
-                <a:ea typeface="ＭＳ Ｐゴシック" charset="-128"/>
-              </a:rPr>
-              <a:t>SC71] </a:t>
+              <a:t>[SC71] </a:t>
             </a:r>
             <a:r>
               <a:rPr lang="en-US" altLang="ja-JP" sz="3600" dirty="0">
@@ -4610,8 +4622,8 @@
           </a:p>
         </p:txBody>
       </p:sp>
-      <mc:AlternateContent xmlns:mc="http://schemas.openxmlformats.org/markup-compatibility/2006">
-        <mc:Choice xmlns:a14="http://schemas.microsoft.com/office/drawing/2010/main" Requires="a14">
+      <mc:AlternateContent xmlns:mc="http://schemas.openxmlformats.org/markup-compatibility/2006" xmlns:a14="http://schemas.microsoft.com/office/drawing/2010/main">
+        <mc:Choice Requires="a14">
           <p:sp>
             <p:nvSpPr>
               <p:cNvPr id="38" name="Text Box 247"/>
@@ -4755,16 +4767,7 @@
                     </a:solidFill>
                     <a:ea typeface="ＭＳ Ｐゴシック" charset="-128"/>
                   </a:rPr>
-                  <a:t>The</a:t>
-                </a:r>
-                <a:r>
-                  <a:rPr lang="et-EE" altLang="zh-CN" sz="3600" dirty="0" smtClean="0">
-                    <a:solidFill>
-                      <a:schemeClr val="tx1"/>
-                    </a:solidFill>
-                    <a:ea typeface="ＭＳ Ｐゴシック" charset="-128"/>
-                  </a:rPr>
-                  <a:t> </a:t>
+                  <a:t>The </a:t>
                 </a:r>
                 <a:r>
                   <a:rPr lang="en-US" altLang="zh-CN" sz="3600" dirty="0" smtClean="0">
@@ -5072,7 +5075,7 @@
                 </a:r>
               </a:p>
               <a:p>
-                <a:pPr marL="0" lvl="1" indent="0" algn="just">
+                <a:pPr marL="0" lvl="1" indent="0" algn="ctr">
                   <a:lnSpc>
                     <a:spcPct val="120000"/>
                   </a:lnSpc>
@@ -5246,7 +5249,7 @@
                                 <a:latin typeface="Cambria Math" panose="02040503050406030204" pitchFamily="18" charset="0"/>
                                 <a:ea typeface="ＭＳ Ｐゴシック" charset="-128"/>
                               </a:rPr>
-                              <m:t>.</m:t>
+                              <m:t>,</m:t>
                             </m:r>
                           </m:e>
                           <m:e>
@@ -5369,7 +5372,7 @@
             </p:txBody>
           </p:sp>
         </mc:Choice>
-        <mc:Fallback>
+        <mc:Fallback xmlns="">
           <p:sp>
             <p:nvSpPr>
               <p:cNvPr id="38" name="Text Box 247"/>
@@ -5940,7 +5943,19 @@
               <a:rPr lang="et-EE" altLang="ja-JP" sz="3600" dirty="0" smtClean="0">
                 <a:ea typeface="ＭＳ Ｐゴシック" charset="-128"/>
               </a:rPr>
-              <a:t>The construction of the warping matrix and search for the optimal warping path is animated, the resulting alignment is dynamically shown. User can insert their own series or use random data. Different parameters, including global contraints can be selected. </a:t>
+              <a:t>The construction of the warping matrix and search for the optimal warping path is animated, the resulting alignment is dynamically shown. </a:t>
+            </a:r>
+            <a:r>
+              <a:rPr lang="et-EE" altLang="ja-JP" sz="3600" dirty="0" err="1" smtClean="0">
+                <a:ea typeface="ＭＳ Ｐゴシック" charset="-128"/>
+              </a:rPr>
+              <a:t>Users</a:t>
+            </a:r>
+            <a:r>
+              <a:rPr lang="et-EE" altLang="ja-JP" sz="3600" dirty="0" smtClean="0">
+                <a:ea typeface="ＭＳ Ｐゴシック" charset="-128"/>
+              </a:rPr>
+              <a:t> can insert their own series or use random data. Different parameters, including global contraints can be selected. </a:t>
             </a:r>
           </a:p>
           <a:p>
@@ -6625,21 +6640,11 @@
               <a:rPr lang="et-EE" altLang="zh-CN" sz="3600" dirty="0" smtClean="0">
                 <a:ea typeface="SimSun" pitchFamily="2" charset="-122"/>
               </a:rPr>
-              <a:t>[Ita75] </a:t>
-            </a:r>
-            <a:r>
-              <a:rPr lang="et-EE" altLang="zh-CN" sz="3600" dirty="0" smtClean="0">
-                <a:ea typeface="SimSun" pitchFamily="2" charset="-122"/>
-              </a:rPr>
-              <a:t>	</a:t>
+              <a:t>[Ita75] 	</a:t>
             </a:r>
             <a:r>
               <a:rPr lang="en-US" sz="3600" dirty="0" smtClean="0"/>
-              <a:t>F</a:t>
-            </a:r>
-            <a:r>
-              <a:rPr lang="en-US" sz="3600" dirty="0" smtClean="0"/>
-              <a:t>. </a:t>
+              <a:t>F. </a:t>
             </a:r>
             <a:r>
               <a:rPr lang="en-US" sz="3600" dirty="0" err="1" smtClean="0"/>
@@ -6655,11 +6660,7 @@
             </a:r>
             <a:r>
               <a:rPr lang="en-US" sz="3600" dirty="0" smtClean="0"/>
-              <a:t>principle </a:t>
-            </a:r>
-            <a:r>
-              <a:rPr lang="en-US" sz="3600" dirty="0" smtClean="0"/>
-              <a:t>applied to speech</a:t>
+              <a:t>principle applied to speech</a:t>
             </a:r>
             <a:r>
               <a:rPr lang="et-EE" sz="3600" dirty="0" smtClean="0"/>
@@ -6683,11 +6684,7 @@
             </a:r>
             <a:r>
               <a:rPr lang="en-US" sz="3600" dirty="0" smtClean="0"/>
-              <a:t>Transactions </a:t>
-            </a:r>
-            <a:r>
-              <a:rPr lang="en-US" sz="3600" dirty="0" smtClean="0"/>
-              <a:t>on Acoustics, Speech, </a:t>
+              <a:t>Transactions on Acoustics, Speech, </a:t>
             </a:r>
             <a:r>
               <a:rPr lang="et-EE" sz="3600" dirty="0" smtClean="0"/>
@@ -6715,19 +6712,7 @@
             </a:r>
             <a:r>
               <a:rPr lang="et-EE" sz="3600" dirty="0" smtClean="0"/>
-              <a:t>, 23(1</a:t>
-            </a:r>
-            <a:r>
-              <a:rPr lang="et-EE" sz="3600" dirty="0" smtClean="0"/>
-              <a:t>):67-72, </a:t>
-            </a:r>
-            <a:r>
-              <a:rPr lang="et-EE" sz="3600" dirty="0" smtClean="0"/>
-              <a:t>1975</a:t>
-            </a:r>
-            <a:r>
-              <a:rPr lang="et-EE" sz="3600" dirty="0" smtClean="0"/>
-              <a:t>.</a:t>
+              <a:t>, 23(1):67-72, 1975.</a:t>
             </a:r>
             <a:endParaRPr lang="et-EE" altLang="zh-CN" sz="3600" dirty="0" smtClean="0">
               <a:ea typeface="SimSun" pitchFamily="2" charset="-122"/>
@@ -6737,11 +6722,7 @@
             <a:pPr algn="just"/>
             <a:r>
               <a:rPr lang="et-EE" sz="3600" dirty="0" smtClean="0"/>
-              <a:t>[</a:t>
-            </a:r>
-            <a:r>
-              <a:rPr lang="et-EE" sz="3600" dirty="0" smtClean="0"/>
-              <a:t>SC71]	</a:t>
+              <a:t>[SC71]	</a:t>
             </a:r>
             <a:r>
               <a:rPr lang="en-US" sz="3600" dirty="0" smtClean="0"/>
@@ -6793,11 +6774,7 @@
             </a:r>
             <a:r>
               <a:rPr lang="en-US" sz="3600" dirty="0" smtClean="0"/>
-              <a:t>recognition. In Proceedings of the </a:t>
-            </a:r>
-            <a:r>
-              <a:rPr lang="en-US" sz="3600" dirty="0" smtClean="0"/>
-              <a:t>Seventh</a:t>
+              <a:t>recognition. In Proceedings of the Seventh</a:t>
             </a:r>
             <a:r>
               <a:rPr lang="et-EE" sz="3600" dirty="0" smtClean="0"/>
@@ -6837,15 +6814,7 @@
             </a:r>
             <a:r>
               <a:rPr lang="et-EE" sz="3600" dirty="0" smtClean="0"/>
-              <a:t> </a:t>
-            </a:r>
-            <a:r>
-              <a:rPr lang="et-EE" sz="3600" dirty="0" smtClean="0"/>
-              <a:t>3, pages 65-69, Budapest, 1971</a:t>
-            </a:r>
-            <a:r>
-              <a:rPr lang="et-EE" sz="3600" dirty="0" smtClean="0"/>
-              <a:t>.</a:t>
+              <a:t> 3, pages 65-69, Budapest, 1971.</a:t>
             </a:r>
           </a:p>
           <a:p>

</xml_diff>